<commit_message>
Modificata presentazione PowerPoint progetto
</commit_message>
<xml_diff>
--- a/Face-to-BMI.pptx
+++ b/Face-to-BMI.pptx
@@ -5,7 +5,7 @@
     <p:sldMasterId id="2147483648" r:id="rId1"/>
   </p:sldMasterIdLst>
   <p:notesMasterIdLst>
-    <p:notesMasterId r:id="rId16"/>
+    <p:notesMasterId r:id="rId18"/>
   </p:notesMasterIdLst>
   <p:sldIdLst>
     <p:sldId id="256" r:id="rId2"/>
@@ -21,31 +21,33 @@
     <p:sldId id="261" r:id="rId12"/>
     <p:sldId id="268" r:id="rId13"/>
     <p:sldId id="279" r:id="rId14"/>
-    <p:sldId id="269" r:id="rId15"/>
+    <p:sldId id="280" r:id="rId15"/>
+    <p:sldId id="281" r:id="rId16"/>
+    <p:sldId id="269" r:id="rId17"/>
   </p:sldIdLst>
   <p:sldSz cx="18288000" cy="10287000"/>
   <p:notesSz cx="6858000" cy="9144000"/>
   <p:embeddedFontLst>
     <p:embeddedFont>
       <p:font typeface="Aptos ExtraBold" panose="020B0004020202020204" pitchFamily="34" charset="0"/>
-      <p:bold r:id="rId17"/>
-      <p:boldItalic r:id="rId18"/>
+      <p:bold r:id="rId19"/>
+      <p:boldItalic r:id="rId20"/>
     </p:embeddedFont>
     <p:embeddedFont>
       <p:font typeface="Cambria Math" panose="02040503050406030204" pitchFamily="18" charset="0"/>
-      <p:regular r:id="rId19"/>
+      <p:regular r:id="rId21"/>
     </p:embeddedFont>
     <p:embeddedFont>
       <p:font typeface="Cheddar" panose="020B0604020202020204" charset="0"/>
-      <p:regular r:id="rId20"/>
+      <p:regular r:id="rId22"/>
     </p:embeddedFont>
     <p:embeddedFont>
       <p:font typeface="Telegraf" panose="020B0604020202020204" charset="0"/>
-      <p:regular r:id="rId21"/>
+      <p:regular r:id="rId23"/>
     </p:embeddedFont>
     <p:embeddedFont>
       <p:font typeface="Telegraf Bold" panose="020B0604020202020204" charset="0"/>
-      <p:regular r:id="rId22"/>
+      <p:regular r:id="rId24"/>
     </p:embeddedFont>
   </p:embeddedFontLst>
   <p:defaultTextStyle>
@@ -244,7 +246,7 @@
           <a:p>
             <a:fld id="{8C73276E-C429-48C9-BABA-85167734EA3F}" type="datetimeFigureOut">
               <a:rPr lang="it-IT" smtClean="0"/>
-              <a:t>25/09/2024</a:t>
+              <a:t>04/10/2024</a:t>
             </a:fld>
             <a:endParaRPr lang="it-IT"/>
           </a:p>
@@ -679,6 +681,114 @@
 </p:notes>
 </file>
 
+<file path=ppt/notesSlides/notesSlide3.xml><?xml version="1.0" encoding="utf-8"?>
+<p:notes xmlns:a="http://schemas.openxmlformats.org/drawingml/2006/main" xmlns:r="http://schemas.openxmlformats.org/officeDocument/2006/relationships" xmlns:p="http://schemas.openxmlformats.org/presentationml/2006/main">
+  <p:cSld>
+    <p:spTree>
+      <p:nvGrpSpPr>
+        <p:cNvPr id="1" name="">
+          <a:extLst>
+            <a:ext uri="{FF2B5EF4-FFF2-40B4-BE49-F238E27FC236}">
+              <a16:creationId xmlns:a16="http://schemas.microsoft.com/office/drawing/2014/main" id="{7B82C8B1-0FCD-B3FE-F834-014FF57EF3D7}"/>
+            </a:ext>
+          </a:extLst>
+        </p:cNvPr>
+        <p:cNvGrpSpPr/>
+        <p:nvPr/>
+      </p:nvGrpSpPr>
+      <p:grpSpPr>
+        <a:xfrm>
+          <a:off x="0" y="0"/>
+          <a:ext cx="0" cy="0"/>
+          <a:chOff x="0" y="0"/>
+          <a:chExt cx="0" cy="0"/>
+        </a:xfrm>
+      </p:grpSpPr>
+      <p:sp>
+        <p:nvSpPr>
+          <p:cNvPr id="2" name="Segnaposto immagine diapositiva 1">
+            <a:extLst>
+              <a:ext uri="{FF2B5EF4-FFF2-40B4-BE49-F238E27FC236}">
+                <a16:creationId xmlns:a16="http://schemas.microsoft.com/office/drawing/2014/main" id="{AC6676B9-3F38-CCE4-84A7-57201F1C47E2}"/>
+              </a:ext>
+            </a:extLst>
+          </p:cNvPr>
+          <p:cNvSpPr>
+            <a:spLocks noGrp="1" noRot="1" noChangeAspect="1"/>
+          </p:cNvSpPr>
+          <p:nvPr>
+            <p:ph type="sldImg"/>
+          </p:nvPr>
+        </p:nvSpPr>
+        <p:spPr/>
+      </p:sp>
+      <p:sp>
+        <p:nvSpPr>
+          <p:cNvPr id="3" name="Segnaposto note 2">
+            <a:extLst>
+              <a:ext uri="{FF2B5EF4-FFF2-40B4-BE49-F238E27FC236}">
+                <a16:creationId xmlns:a16="http://schemas.microsoft.com/office/drawing/2014/main" id="{BCECC9FA-E9A9-7014-CCD1-7B70662A7A8F}"/>
+              </a:ext>
+            </a:extLst>
+          </p:cNvPr>
+          <p:cNvSpPr>
+            <a:spLocks noGrp="1"/>
+          </p:cNvSpPr>
+          <p:nvPr>
+            <p:ph type="body" idx="1"/>
+          </p:nvPr>
+        </p:nvSpPr>
+        <p:spPr/>
+        <p:txBody>
+          <a:bodyPr/>
+          <a:lstStyle/>
+          <a:p>
+            <a:endParaRPr lang="it-IT" dirty="0"/>
+          </a:p>
+        </p:txBody>
+      </p:sp>
+      <p:sp>
+        <p:nvSpPr>
+          <p:cNvPr id="4" name="Segnaposto numero diapositiva 3">
+            <a:extLst>
+              <a:ext uri="{FF2B5EF4-FFF2-40B4-BE49-F238E27FC236}">
+                <a16:creationId xmlns:a16="http://schemas.microsoft.com/office/drawing/2014/main" id="{0CF7FB76-A59F-B52B-5A07-43E331DF2DE4}"/>
+              </a:ext>
+            </a:extLst>
+          </p:cNvPr>
+          <p:cNvSpPr>
+            <a:spLocks noGrp="1"/>
+          </p:cNvSpPr>
+          <p:nvPr>
+            <p:ph type="sldNum" sz="quarter" idx="5"/>
+          </p:nvPr>
+        </p:nvSpPr>
+        <p:spPr/>
+        <p:txBody>
+          <a:bodyPr/>
+          <a:lstStyle/>
+          <a:p>
+            <a:fld id="{E8604650-673F-48C8-8075-A19172C392D7}" type="slidenum">
+              <a:rPr lang="it-IT" smtClean="0"/>
+              <a:t>14</a:t>
+            </a:fld>
+            <a:endParaRPr lang="it-IT"/>
+          </a:p>
+        </p:txBody>
+      </p:sp>
+    </p:spTree>
+    <p:extLst>
+      <p:ext uri="{BB962C8B-B14F-4D97-AF65-F5344CB8AC3E}">
+        <p14:creationId xmlns:p14="http://schemas.microsoft.com/office/powerpoint/2010/main" val="3038040037"/>
+      </p:ext>
+    </p:extLst>
+  </p:cSld>
+  <p:clrMapOvr>
+    <a:masterClrMapping/>
+  </p:clrMapOvr>
+</p:notes>
+</file>
+
 <file path=ppt/slideLayouts/slideLayout1.xml><?xml version="1.0" encoding="utf-8"?>
 <p:sldLayout xmlns:a="http://schemas.openxmlformats.org/drawingml/2006/main" xmlns:r="http://schemas.openxmlformats.org/officeDocument/2006/relationships" xmlns:p="http://schemas.openxmlformats.org/presentationml/2006/main" type="title" preserve="1">
   <p:cSld name="Title Slide">
@@ -859,7 +969,7 @@
             <a:fld id="{1D8BD707-D9CF-40AE-B4C6-C98DA3205C09}" type="datetimeFigureOut">
               <a:rPr lang="en-US" smtClean="0"/>
               <a:pPr/>
-              <a:t>9/25/2024</a:t>
+              <a:t>10/4/2024</a:t>
             </a:fld>
             <a:endParaRPr lang="en-US"/>
           </a:p>
@@ -1024,7 +1134,7 @@
             <a:fld id="{1D8BD707-D9CF-40AE-B4C6-C98DA3205C09}" type="datetimeFigureOut">
               <a:rPr lang="en-US" smtClean="0"/>
               <a:pPr/>
-              <a:t>9/25/2024</a:t>
+              <a:t>10/4/2024</a:t>
             </a:fld>
             <a:endParaRPr lang="en-US"/>
           </a:p>
@@ -1199,7 +1309,7 @@
             <a:fld id="{1D8BD707-D9CF-40AE-B4C6-C98DA3205C09}" type="datetimeFigureOut">
               <a:rPr lang="en-US" smtClean="0"/>
               <a:pPr/>
-              <a:t>9/25/2024</a:t>
+              <a:t>10/4/2024</a:t>
             </a:fld>
             <a:endParaRPr lang="en-US"/>
           </a:p>
@@ -1364,7 +1474,7 @@
             <a:fld id="{1D8BD707-D9CF-40AE-B4C6-C98DA3205C09}" type="datetimeFigureOut">
               <a:rPr lang="en-US" smtClean="0"/>
               <a:pPr/>
-              <a:t>9/25/2024</a:t>
+              <a:t>10/4/2024</a:t>
             </a:fld>
             <a:endParaRPr lang="en-US"/>
           </a:p>
@@ -1606,7 +1716,7 @@
             <a:fld id="{1D8BD707-D9CF-40AE-B4C6-C98DA3205C09}" type="datetimeFigureOut">
               <a:rPr lang="en-US" smtClean="0"/>
               <a:pPr/>
-              <a:t>9/25/2024</a:t>
+              <a:t>10/4/2024</a:t>
             </a:fld>
             <a:endParaRPr lang="en-US"/>
           </a:p>
@@ -1888,7 +1998,7 @@
             <a:fld id="{1D8BD707-D9CF-40AE-B4C6-C98DA3205C09}" type="datetimeFigureOut">
               <a:rPr lang="en-US" smtClean="0"/>
               <a:pPr/>
-              <a:t>9/25/2024</a:t>
+              <a:t>10/4/2024</a:t>
             </a:fld>
             <a:endParaRPr lang="en-US"/>
           </a:p>
@@ -2304,7 +2414,7 @@
             <a:fld id="{1D8BD707-D9CF-40AE-B4C6-C98DA3205C09}" type="datetimeFigureOut">
               <a:rPr lang="en-US" smtClean="0"/>
               <a:pPr/>
-              <a:t>9/25/2024</a:t>
+              <a:t>10/4/2024</a:t>
             </a:fld>
             <a:endParaRPr lang="en-US"/>
           </a:p>
@@ -2418,7 +2528,7 @@
             <a:fld id="{1D8BD707-D9CF-40AE-B4C6-C98DA3205C09}" type="datetimeFigureOut">
               <a:rPr lang="en-US" smtClean="0"/>
               <a:pPr/>
-              <a:t>9/25/2024</a:t>
+              <a:t>10/4/2024</a:t>
             </a:fld>
             <a:endParaRPr lang="en-US"/>
           </a:p>
@@ -2510,7 +2620,7 @@
             <a:fld id="{1D8BD707-D9CF-40AE-B4C6-C98DA3205C09}" type="datetimeFigureOut">
               <a:rPr lang="en-US" smtClean="0"/>
               <a:pPr/>
-              <a:t>9/25/2024</a:t>
+              <a:t>10/4/2024</a:t>
             </a:fld>
             <a:endParaRPr lang="en-US"/>
           </a:p>
@@ -2782,7 +2892,7 @@
             <a:fld id="{1D8BD707-D9CF-40AE-B4C6-C98DA3205C09}" type="datetimeFigureOut">
               <a:rPr lang="en-US" smtClean="0"/>
               <a:pPr/>
-              <a:t>9/25/2024</a:t>
+              <a:t>10/4/2024</a:t>
             </a:fld>
             <a:endParaRPr lang="en-US"/>
           </a:p>
@@ -3031,7 +3141,7 @@
             <a:fld id="{1D8BD707-D9CF-40AE-B4C6-C98DA3205C09}" type="datetimeFigureOut">
               <a:rPr lang="en-US" smtClean="0"/>
               <a:pPr/>
-              <a:t>9/25/2024</a:t>
+              <a:t>10/4/2024</a:t>
             </a:fld>
             <a:endParaRPr lang="en-US"/>
           </a:p>
@@ -3239,7 +3349,7 @@
             <a:fld id="{1D8BD707-D9CF-40AE-B4C6-C98DA3205C09}" type="datetimeFigureOut">
               <a:rPr lang="en-US" smtClean="0"/>
               <a:pPr/>
-              <a:t>9/25/2024</a:t>
+              <a:t>10/4/2024</a:t>
             </a:fld>
             <a:endParaRPr lang="en-US"/>
           </a:p>
@@ -4903,7 +5013,10 @@
               </a:pathLst>
             </a:custGeom>
             <a:solidFill>
-              <a:srgbClr val="02B676"/>
+              <a:schemeClr val="tx2">
+                <a:lumMod val="60000"/>
+                <a:lumOff val="40000"/>
+              </a:schemeClr>
             </a:solidFill>
           </p:spPr>
           <p:txBody>
@@ -4940,9 +5053,6 @@
               </a:pPr>
               <a:r>
                 <a:rPr lang="en-US" sz="3200" b="1" dirty="0">
-                  <a:solidFill>
-                    <a:srgbClr val="FFFFFF"/>
-                  </a:solidFill>
                   <a:latin typeface="Telegraf Bold"/>
                   <a:ea typeface="Telegraf Bold"/>
                   <a:cs typeface="Telegraf Bold"/>
@@ -4952,9 +5062,6 @@
               </a:r>
               <a:br>
                 <a:rPr lang="en-US" sz="3200" b="1" dirty="0">
-                  <a:solidFill>
-                    <a:srgbClr val="FFFFFF"/>
-                  </a:solidFill>
                   <a:latin typeface="Telegraf Bold"/>
                   <a:ea typeface="Telegraf Bold"/>
                   <a:cs typeface="Telegraf Bold"/>
@@ -4963,9 +5070,6 @@
               </a:br>
               <a:r>
                 <a:rPr lang="en-US" sz="2800" b="1" dirty="0">
-                  <a:solidFill>
-                    <a:srgbClr val="FFFFFF"/>
-                  </a:solidFill>
                   <a:latin typeface="Telegraf" panose="020B0604020202020204" charset="0"/>
                   <a:ea typeface="Telegraf Bold"/>
                   <a:cs typeface="Telegraf Bold"/>
@@ -4975,9 +5079,6 @@
               </a:r>
               <a:r>
                 <a:rPr lang="en-US" sz="2800" dirty="0">
-                  <a:solidFill>
-                    <a:srgbClr val="FFFFFF"/>
-                  </a:solidFill>
                   <a:latin typeface="Telegraf" panose="020B0604020202020204" charset="0"/>
                   <a:ea typeface="Telegraf Bold"/>
                   <a:cs typeface="Telegraf Bold"/>
@@ -6318,7 +6419,7 @@
               </a:pathLst>
             </a:custGeom>
             <a:solidFill>
-              <a:srgbClr val="FFC97F"/>
+              <a:srgbClr val="02B676"/>
             </a:solidFill>
           </p:spPr>
           <p:txBody>
@@ -6362,7 +6463,7 @@
               <a:r>
                 <a:rPr lang="en-US" sz="3199" b="1" dirty="0">
                   <a:solidFill>
-                    <a:srgbClr val="000000"/>
+                    <a:schemeClr val="bg1"/>
                   </a:solidFill>
                   <a:latin typeface="Telegraf Bold"/>
                   <a:ea typeface="Telegraf Bold"/>
@@ -6374,7 +6475,7 @@
               <a:br>
                 <a:rPr lang="en-US" sz="3199" b="1" dirty="0">
                   <a:solidFill>
-                    <a:srgbClr val="000000"/>
+                    <a:schemeClr val="bg1"/>
                   </a:solidFill>
                   <a:latin typeface="Telegraf Bold"/>
                   <a:ea typeface="Telegraf Bold"/>
@@ -6385,7 +6486,7 @@
               <a:r>
                 <a:rPr lang="en-US" sz="2800" dirty="0">
                   <a:solidFill>
-                    <a:srgbClr val="000000"/>
+                    <a:schemeClr val="bg1"/>
                   </a:solidFill>
                   <a:latin typeface="Telegraf" panose="020B0604020202020204" charset="0"/>
                   <a:ea typeface="Telegraf Bold"/>
@@ -6769,9 +6870,6 @@
             <a:pPr algn="ctr"/>
             <a:r>
               <a:rPr lang="en-US" sz="1800" dirty="0">
-                <a:solidFill>
-                  <a:schemeClr val="bg1"/>
-                </a:solidFill>
                 <a:latin typeface="Telegraf" panose="020B0604020202020204" charset="0"/>
                 <a:ea typeface="Telegraf Bold"/>
                 <a:cs typeface="Telegraf Bold"/>
@@ -6781,9 +6879,6 @@
             </a:r>
             <a:br>
               <a:rPr lang="en-US" sz="1800" dirty="0">
-                <a:solidFill>
-                  <a:schemeClr val="bg1"/>
-                </a:solidFill>
                 <a:latin typeface="Telegraf" panose="020B0604020202020204" charset="0"/>
                 <a:ea typeface="Telegraf Bold"/>
                 <a:cs typeface="Telegraf Bold"/>
@@ -6792,9 +6887,6 @@
             </a:br>
             <a:r>
               <a:rPr lang="en-US" sz="1800" dirty="0">
-                <a:solidFill>
-                  <a:schemeClr val="bg1"/>
-                </a:solidFill>
                 <a:latin typeface="Telegraf" panose="020B0604020202020204" charset="0"/>
                 <a:ea typeface="Telegraf Bold"/>
                 <a:cs typeface="Telegraf Bold"/>
@@ -6802,11 +6894,7 @@
               </a:rPr>
               <a:t>MAE = 3,50</a:t>
             </a:r>
-            <a:endParaRPr lang="it-IT" dirty="0">
-              <a:solidFill>
-                <a:schemeClr val="bg1"/>
-              </a:solidFill>
-            </a:endParaRPr>
+            <a:endParaRPr lang="it-IT" dirty="0"/>
           </a:p>
         </p:txBody>
       </p:sp>
@@ -7046,7 +7134,7 @@
             <a:r>
               <a:rPr lang="en-US" sz="1800" dirty="0">
                 <a:solidFill>
-                  <a:srgbClr val="000000"/>
+                  <a:schemeClr val="bg1"/>
                 </a:solidFill>
                 <a:latin typeface="Telegraf" panose="020B0604020202020204" charset="0"/>
                 <a:ea typeface="Telegraf Bold"/>
@@ -7058,7 +7146,7 @@
             <a:br>
               <a:rPr lang="en-US" sz="1800" dirty="0">
                 <a:solidFill>
-                  <a:srgbClr val="000000"/>
+                  <a:schemeClr val="bg1"/>
                 </a:solidFill>
                 <a:latin typeface="Telegraf" panose="020B0604020202020204" charset="0"/>
                 <a:ea typeface="Telegraf Bold"/>
@@ -7069,7 +7157,7 @@
             <a:r>
               <a:rPr lang="en-US" sz="1800" dirty="0">
                 <a:solidFill>
-                  <a:srgbClr val="000000"/>
+                  <a:schemeClr val="bg1"/>
                 </a:solidFill>
                 <a:latin typeface="Telegraf" panose="020B0604020202020204" charset="0"/>
                 <a:ea typeface="Telegraf Bold"/>
@@ -7078,7 +7166,11 @@
               </a:rPr>
               <a:t>MAE = 3,75</a:t>
             </a:r>
-            <a:endParaRPr lang="it-IT" dirty="0"/>
+            <a:endParaRPr lang="it-IT" dirty="0">
+              <a:solidFill>
+                <a:schemeClr val="bg1"/>
+              </a:solidFill>
+            </a:endParaRPr>
           </a:p>
         </p:txBody>
       </p:sp>
@@ -7096,8 +7188,8 @@
         </p:nvSpPr>
         <p:spPr>
           <a:xfrm>
-            <a:off x="-8086" y="9885407"/>
-            <a:ext cx="9393991" cy="307777"/>
+            <a:off x="-2760" y="9554363"/>
+            <a:ext cx="9393991" cy="738664"/>
           </a:xfrm>
           <a:prstGeom prst="rect">
             <a:avLst/>
@@ -7118,7 +7210,66 @@
                 <a:latin typeface="Telegraf" panose="020B0604020202020204" charset="0"/>
                 <a:sym typeface="Telegraf Bold"/>
               </a:rPr>
-              <a:t>Per vedere meglio andamento MSE durante la fase di training , visionare i grafici presenti nella documentazione.</a:t>
+              <a:t>Per vedere meglio andamento MSE durante la fase di training , visionare i grafici presenti nella documentazione. In </a:t>
+            </a:r>
+            <a:r>
+              <a:rPr lang="it-IT" sz="1400" i="1" dirty="0">
+                <a:solidFill>
+                  <a:srgbClr val="02B676"/>
+                </a:solidFill>
+                <a:latin typeface="Telegraf" panose="020B0604020202020204" charset="0"/>
+                <a:sym typeface="Telegraf Bold"/>
+              </a:rPr>
+              <a:t>verde</a:t>
+            </a:r>
+            <a:r>
+              <a:rPr lang="it-IT" sz="1400" i="1" dirty="0">
+                <a:solidFill>
+                  <a:srgbClr val="000000"/>
+                </a:solidFill>
+                <a:latin typeface="Telegraf" panose="020B0604020202020204" charset="0"/>
+                <a:sym typeface="Telegraf Bold"/>
+              </a:rPr>
+              <a:t> evidenziata la idea migliore del progetto, scelta dopo una fase di test finale.</a:t>
+            </a:r>
+            <a:br>
+              <a:rPr lang="it-IT" sz="1400" i="1" dirty="0">
+                <a:solidFill>
+                  <a:srgbClr val="000000"/>
+                </a:solidFill>
+                <a:latin typeface="Telegraf" panose="020B0604020202020204" charset="0"/>
+                <a:sym typeface="Telegraf Bold"/>
+              </a:rPr>
+            </a:br>
+            <a:r>
+              <a:rPr lang="it-IT" sz="1400" i="1" dirty="0">
+                <a:solidFill>
+                  <a:srgbClr val="000000"/>
+                </a:solidFill>
+                <a:latin typeface="Telegraf" panose="020B0604020202020204" charset="0"/>
+                <a:sym typeface="Telegraf Bold"/>
+              </a:rPr>
+              <a:t>In </a:t>
+            </a:r>
+            <a:r>
+              <a:rPr lang="it-IT" sz="1400" i="1" dirty="0">
+                <a:solidFill>
+                  <a:srgbClr val="558ED5"/>
+                </a:solidFill>
+                <a:latin typeface="Telegraf" panose="020B0604020202020204" charset="0"/>
+                <a:sym typeface="Telegraf Bold"/>
+              </a:rPr>
+              <a:t>azzurro</a:t>
+            </a:r>
+            <a:r>
+              <a:rPr lang="it-IT" sz="1400" i="1" dirty="0">
+                <a:solidFill>
+                  <a:srgbClr val="000000"/>
+                </a:solidFill>
+                <a:latin typeface="Telegraf" panose="020B0604020202020204" charset="0"/>
+                <a:sym typeface="Telegraf Bold"/>
+              </a:rPr>
+              <a:t> l’idea che ha performato meglio durante la fase di valutazione con il test set.</a:t>
             </a:r>
             <a:endParaRPr lang="it-IT" sz="1400" i="1" dirty="0"/>
           </a:p>
@@ -8409,8 +8560,8 @@
         </p:nvSpPr>
         <p:spPr>
           <a:xfrm>
-            <a:off x="4943474" y="801786"/>
-            <a:ext cx="8401050" cy="1795363"/>
+            <a:off x="3538537" y="753224"/>
+            <a:ext cx="11210924" cy="1795363"/>
           </a:xfrm>
           <a:prstGeom prst="rect">
             <a:avLst/>
@@ -8437,7 +8588,7 @@
                 <a:cs typeface="Cheddar"/>
                 <a:sym typeface="Cheddar"/>
               </a:rPr>
-              <a:t>RETE NEURALE CONVOLUZIONALE</a:t>
+              <a:t>RETE NEURALE CONVOLUZIONALE (IDEA 6)</a:t>
             </a:r>
           </a:p>
         </p:txBody>
@@ -9435,6 +9586,1773 @@
     </p:bg>
     <p:spTree>
       <p:nvGrpSpPr>
+        <p:cNvPr id="1" name="">
+          <a:extLst>
+            <a:ext uri="{FF2B5EF4-FFF2-40B4-BE49-F238E27FC236}">
+              <a16:creationId xmlns:a16="http://schemas.microsoft.com/office/drawing/2014/main" id="{3C601D74-B2FB-72B8-ECD4-8F5199975851}"/>
+            </a:ext>
+          </a:extLst>
+        </p:cNvPr>
+        <p:cNvGrpSpPr/>
+        <p:nvPr/>
+      </p:nvGrpSpPr>
+      <p:grpSpPr>
+        <a:xfrm>
+          <a:off x="0" y="0"/>
+          <a:ext cx="0" cy="0"/>
+          <a:chOff x="0" y="0"/>
+          <a:chExt cx="0" cy="0"/>
+        </a:xfrm>
+      </p:grpSpPr>
+      <p:sp>
+        <p:nvSpPr>
+          <p:cNvPr id="2" name="TextBox 2">
+            <a:extLst>
+              <a:ext uri="{FF2B5EF4-FFF2-40B4-BE49-F238E27FC236}">
+                <a16:creationId xmlns:a16="http://schemas.microsoft.com/office/drawing/2014/main" id="{55B3BE3E-FE6F-C27E-A6C3-A257D7023727}"/>
+              </a:ext>
+            </a:extLst>
+          </p:cNvPr>
+          <p:cNvSpPr txBox="1"/>
+          <p:nvPr/>
+        </p:nvSpPr>
+        <p:spPr>
+          <a:xfrm>
+            <a:off x="4787587" y="613569"/>
+            <a:ext cx="8115300" cy="897682"/>
+          </a:xfrm>
+          <a:prstGeom prst="rect">
+            <a:avLst/>
+          </a:prstGeom>
+        </p:spPr>
+        <p:txBody>
+          <a:bodyPr lIns="0" tIns="0" rIns="0" bIns="0" rtlCol="0" anchor="t">
+            <a:spAutoFit/>
+          </a:bodyPr>
+          <a:lstStyle/>
+          <a:p>
+            <a:pPr algn="ctr">
+              <a:lnSpc>
+                <a:spcPts val="6999"/>
+              </a:lnSpc>
+            </a:pPr>
+            <a:r>
+              <a:rPr lang="en-US" sz="6999" spc="342" dirty="0">
+                <a:solidFill>
+                  <a:srgbClr val="290606"/>
+                </a:solidFill>
+                <a:latin typeface="Cheddar"/>
+                <a:ea typeface="Cheddar"/>
+                <a:cs typeface="Cheddar"/>
+                <a:sym typeface="Cheddar"/>
+              </a:rPr>
+              <a:t>IDEA 10</a:t>
+            </a:r>
+          </a:p>
+        </p:txBody>
+      </p:sp>
+      <p:grpSp>
+        <p:nvGrpSpPr>
+          <p:cNvPr id="3" name="Group 3">
+            <a:extLst>
+              <a:ext uri="{FF2B5EF4-FFF2-40B4-BE49-F238E27FC236}">
+                <a16:creationId xmlns:a16="http://schemas.microsoft.com/office/drawing/2014/main" id="{FCF01797-5D6F-48B4-823E-CBB94C92B79E}"/>
+              </a:ext>
+            </a:extLst>
+          </p:cNvPr>
+          <p:cNvGrpSpPr/>
+          <p:nvPr/>
+        </p:nvGrpSpPr>
+        <p:grpSpPr>
+          <a:xfrm>
+            <a:off x="1447800" y="5568308"/>
+            <a:ext cx="4561929" cy="4510832"/>
+            <a:chOff x="0" y="0"/>
+            <a:chExt cx="1235036" cy="1434426"/>
+          </a:xfrm>
+        </p:grpSpPr>
+        <p:sp>
+          <p:nvSpPr>
+            <p:cNvPr id="4" name="Freeform 4">
+              <a:extLst>
+                <a:ext uri="{FF2B5EF4-FFF2-40B4-BE49-F238E27FC236}">
+                  <a16:creationId xmlns:a16="http://schemas.microsoft.com/office/drawing/2014/main" id="{EFB1E3C8-F142-B441-15FA-82234A86213B}"/>
+                </a:ext>
+              </a:extLst>
+            </p:cNvPr>
+            <p:cNvSpPr/>
+            <p:nvPr/>
+          </p:nvSpPr>
+          <p:spPr>
+            <a:xfrm>
+              <a:off x="0" y="0"/>
+              <a:ext cx="1235036" cy="1434426"/>
+            </a:xfrm>
+            <a:custGeom>
+              <a:avLst/>
+              <a:gdLst/>
+              <a:ahLst/>
+              <a:cxnLst/>
+              <a:rect l="l" t="t" r="r" b="b"/>
+              <a:pathLst>
+                <a:path w="1235036" h="1434426">
+                  <a:moveTo>
+                    <a:pt x="86551" y="0"/>
+                  </a:moveTo>
+                  <a:lnTo>
+                    <a:pt x="1148486" y="0"/>
+                  </a:lnTo>
+                  <a:cubicBezTo>
+                    <a:pt x="1196286" y="0"/>
+                    <a:pt x="1235036" y="38750"/>
+                    <a:pt x="1235036" y="86551"/>
+                  </a:cubicBezTo>
+                  <a:lnTo>
+                    <a:pt x="1235036" y="1347875"/>
+                  </a:lnTo>
+                  <a:cubicBezTo>
+                    <a:pt x="1235036" y="1395676"/>
+                    <a:pt x="1196286" y="1434426"/>
+                    <a:pt x="1148486" y="1434426"/>
+                  </a:cubicBezTo>
+                  <a:lnTo>
+                    <a:pt x="86551" y="1434426"/>
+                  </a:lnTo>
+                  <a:cubicBezTo>
+                    <a:pt x="63596" y="1434426"/>
+                    <a:pt x="41581" y="1425307"/>
+                    <a:pt x="25350" y="1409076"/>
+                  </a:cubicBezTo>
+                  <a:cubicBezTo>
+                    <a:pt x="9119" y="1392844"/>
+                    <a:pt x="0" y="1370830"/>
+                    <a:pt x="0" y="1347875"/>
+                  </a:cubicBezTo>
+                  <a:lnTo>
+                    <a:pt x="0" y="86551"/>
+                  </a:lnTo>
+                  <a:cubicBezTo>
+                    <a:pt x="0" y="63596"/>
+                    <a:pt x="9119" y="41581"/>
+                    <a:pt x="25350" y="25350"/>
+                  </a:cubicBezTo>
+                  <a:cubicBezTo>
+                    <a:pt x="41581" y="9119"/>
+                    <a:pt x="63596" y="0"/>
+                    <a:pt x="86551" y="0"/>
+                  </a:cubicBezTo>
+                  <a:close/>
+                </a:path>
+              </a:pathLst>
+            </a:custGeom>
+            <a:solidFill>
+              <a:srgbClr val="02B676"/>
+            </a:solidFill>
+          </p:spPr>
+          <p:txBody>
+            <a:bodyPr/>
+            <a:lstStyle/>
+            <a:p>
+              <a:endParaRPr lang="it-IT"/>
+            </a:p>
+          </p:txBody>
+        </p:sp>
+        <p:sp>
+          <p:nvSpPr>
+            <p:cNvPr id="5" name="TextBox 5">
+              <a:extLst>
+                <a:ext uri="{FF2B5EF4-FFF2-40B4-BE49-F238E27FC236}">
+                  <a16:creationId xmlns:a16="http://schemas.microsoft.com/office/drawing/2014/main" id="{2EB8F2C0-AA01-50DF-8156-4C349CC6A17D}"/>
+                </a:ext>
+              </a:extLst>
+            </p:cNvPr>
+            <p:cNvSpPr txBox="1"/>
+            <p:nvPr/>
+          </p:nvSpPr>
+          <p:spPr>
+            <a:xfrm>
+              <a:off x="0" y="9525"/>
+              <a:ext cx="1235036" cy="1424901"/>
+            </a:xfrm>
+            <a:prstGeom prst="rect">
+              <a:avLst/>
+            </a:prstGeom>
+          </p:spPr>
+          <p:txBody>
+            <a:bodyPr lIns="50800" tIns="50800" rIns="50800" bIns="50800" rtlCol="0" anchor="ctr"/>
+            <a:lstStyle/>
+            <a:p>
+              <a:pPr algn="ctr">
+                <a:lnSpc>
+                  <a:spcPts val="2200"/>
+                </a:lnSpc>
+              </a:pPr>
+              <a:endParaRPr/>
+            </a:p>
+          </p:txBody>
+        </p:sp>
+      </p:grpSp>
+      <p:grpSp>
+        <p:nvGrpSpPr>
+          <p:cNvPr id="6" name="Group 6">
+            <a:extLst>
+              <a:ext uri="{FF2B5EF4-FFF2-40B4-BE49-F238E27FC236}">
+                <a16:creationId xmlns:a16="http://schemas.microsoft.com/office/drawing/2014/main" id="{07C5A06D-221A-19B4-0864-C9062FD3BDF8}"/>
+              </a:ext>
+            </a:extLst>
+          </p:cNvPr>
+          <p:cNvGrpSpPr/>
+          <p:nvPr/>
+        </p:nvGrpSpPr>
+        <p:grpSpPr>
+          <a:xfrm>
+            <a:off x="6432826" y="5568308"/>
+            <a:ext cx="4561929" cy="4510832"/>
+            <a:chOff x="0" y="0"/>
+            <a:chExt cx="1235036" cy="1434426"/>
+          </a:xfrm>
+        </p:grpSpPr>
+        <p:sp>
+          <p:nvSpPr>
+            <p:cNvPr id="7" name="Freeform 7">
+              <a:extLst>
+                <a:ext uri="{FF2B5EF4-FFF2-40B4-BE49-F238E27FC236}">
+                  <a16:creationId xmlns:a16="http://schemas.microsoft.com/office/drawing/2014/main" id="{F1CA960B-F69B-A87A-5319-A78FEE3677DF}"/>
+                </a:ext>
+              </a:extLst>
+            </p:cNvPr>
+            <p:cNvSpPr/>
+            <p:nvPr/>
+          </p:nvSpPr>
+          <p:spPr>
+            <a:xfrm>
+              <a:off x="0" y="0"/>
+              <a:ext cx="1235036" cy="1434426"/>
+            </a:xfrm>
+            <a:custGeom>
+              <a:avLst/>
+              <a:gdLst/>
+              <a:ahLst/>
+              <a:cxnLst/>
+              <a:rect l="l" t="t" r="r" b="b"/>
+              <a:pathLst>
+                <a:path w="1235036" h="1434426">
+                  <a:moveTo>
+                    <a:pt x="86551" y="0"/>
+                  </a:moveTo>
+                  <a:lnTo>
+                    <a:pt x="1148486" y="0"/>
+                  </a:lnTo>
+                  <a:cubicBezTo>
+                    <a:pt x="1196286" y="0"/>
+                    <a:pt x="1235036" y="38750"/>
+                    <a:pt x="1235036" y="86551"/>
+                  </a:cubicBezTo>
+                  <a:lnTo>
+                    <a:pt x="1235036" y="1347875"/>
+                  </a:lnTo>
+                  <a:cubicBezTo>
+                    <a:pt x="1235036" y="1395676"/>
+                    <a:pt x="1196286" y="1434426"/>
+                    <a:pt x="1148486" y="1434426"/>
+                  </a:cubicBezTo>
+                  <a:lnTo>
+                    <a:pt x="86551" y="1434426"/>
+                  </a:lnTo>
+                  <a:cubicBezTo>
+                    <a:pt x="63596" y="1434426"/>
+                    <a:pt x="41581" y="1425307"/>
+                    <a:pt x="25350" y="1409076"/>
+                  </a:cubicBezTo>
+                  <a:cubicBezTo>
+                    <a:pt x="9119" y="1392844"/>
+                    <a:pt x="0" y="1370830"/>
+                    <a:pt x="0" y="1347875"/>
+                  </a:cubicBezTo>
+                  <a:lnTo>
+                    <a:pt x="0" y="86551"/>
+                  </a:lnTo>
+                  <a:cubicBezTo>
+                    <a:pt x="0" y="63596"/>
+                    <a:pt x="9119" y="41581"/>
+                    <a:pt x="25350" y="25350"/>
+                  </a:cubicBezTo>
+                  <a:cubicBezTo>
+                    <a:pt x="41581" y="9119"/>
+                    <a:pt x="63596" y="0"/>
+                    <a:pt x="86551" y="0"/>
+                  </a:cubicBezTo>
+                  <a:close/>
+                </a:path>
+              </a:pathLst>
+            </a:custGeom>
+            <a:solidFill>
+              <a:srgbClr val="F7562B"/>
+            </a:solidFill>
+          </p:spPr>
+          <p:txBody>
+            <a:bodyPr/>
+            <a:lstStyle/>
+            <a:p>
+              <a:endParaRPr lang="it-IT"/>
+            </a:p>
+          </p:txBody>
+        </p:sp>
+        <p:sp>
+          <p:nvSpPr>
+            <p:cNvPr id="8" name="TextBox 8">
+              <a:extLst>
+                <a:ext uri="{FF2B5EF4-FFF2-40B4-BE49-F238E27FC236}">
+                  <a16:creationId xmlns:a16="http://schemas.microsoft.com/office/drawing/2014/main" id="{286C58C9-C846-8C2C-0B28-833F856E6E67}"/>
+                </a:ext>
+              </a:extLst>
+            </p:cNvPr>
+            <p:cNvSpPr txBox="1"/>
+            <p:nvPr/>
+          </p:nvSpPr>
+          <p:spPr>
+            <a:xfrm>
+              <a:off x="0" y="9525"/>
+              <a:ext cx="1235036" cy="1424901"/>
+            </a:xfrm>
+            <a:prstGeom prst="rect">
+              <a:avLst/>
+            </a:prstGeom>
+          </p:spPr>
+          <p:txBody>
+            <a:bodyPr lIns="50800" tIns="50800" rIns="50800" bIns="50800" rtlCol="0" anchor="ctr"/>
+            <a:lstStyle/>
+            <a:p>
+              <a:pPr algn="ctr">
+                <a:lnSpc>
+                  <a:spcPts val="2200"/>
+                </a:lnSpc>
+              </a:pPr>
+              <a:endParaRPr/>
+            </a:p>
+          </p:txBody>
+        </p:sp>
+      </p:grpSp>
+      <p:grpSp>
+        <p:nvGrpSpPr>
+          <p:cNvPr id="9" name="Group 9">
+            <a:extLst>
+              <a:ext uri="{FF2B5EF4-FFF2-40B4-BE49-F238E27FC236}">
+                <a16:creationId xmlns:a16="http://schemas.microsoft.com/office/drawing/2014/main" id="{7A1DC346-3603-3540-475D-6B3347960653}"/>
+              </a:ext>
+            </a:extLst>
+          </p:cNvPr>
+          <p:cNvGrpSpPr/>
+          <p:nvPr/>
+        </p:nvGrpSpPr>
+        <p:grpSpPr>
+          <a:xfrm>
+            <a:off x="11420849" y="5568308"/>
+            <a:ext cx="4561929" cy="4510832"/>
+            <a:chOff x="0" y="0"/>
+            <a:chExt cx="1235036" cy="1434426"/>
+          </a:xfrm>
+        </p:grpSpPr>
+        <p:sp>
+          <p:nvSpPr>
+            <p:cNvPr id="10" name="Freeform 10">
+              <a:extLst>
+                <a:ext uri="{FF2B5EF4-FFF2-40B4-BE49-F238E27FC236}">
+                  <a16:creationId xmlns:a16="http://schemas.microsoft.com/office/drawing/2014/main" id="{7176F0B3-297D-D087-4120-BBD3A9F50154}"/>
+                </a:ext>
+              </a:extLst>
+            </p:cNvPr>
+            <p:cNvSpPr/>
+            <p:nvPr/>
+          </p:nvSpPr>
+          <p:spPr>
+            <a:xfrm>
+              <a:off x="0" y="0"/>
+              <a:ext cx="1235036" cy="1434426"/>
+            </a:xfrm>
+            <a:custGeom>
+              <a:avLst/>
+              <a:gdLst/>
+              <a:ahLst/>
+              <a:cxnLst/>
+              <a:rect l="l" t="t" r="r" b="b"/>
+              <a:pathLst>
+                <a:path w="1235036" h="1434426">
+                  <a:moveTo>
+                    <a:pt x="86551" y="0"/>
+                  </a:moveTo>
+                  <a:lnTo>
+                    <a:pt x="1148486" y="0"/>
+                  </a:lnTo>
+                  <a:cubicBezTo>
+                    <a:pt x="1196286" y="0"/>
+                    <a:pt x="1235036" y="38750"/>
+                    <a:pt x="1235036" y="86551"/>
+                  </a:cubicBezTo>
+                  <a:lnTo>
+                    <a:pt x="1235036" y="1347875"/>
+                  </a:lnTo>
+                  <a:cubicBezTo>
+                    <a:pt x="1235036" y="1395676"/>
+                    <a:pt x="1196286" y="1434426"/>
+                    <a:pt x="1148486" y="1434426"/>
+                  </a:cubicBezTo>
+                  <a:lnTo>
+                    <a:pt x="86551" y="1434426"/>
+                  </a:lnTo>
+                  <a:cubicBezTo>
+                    <a:pt x="63596" y="1434426"/>
+                    <a:pt x="41581" y="1425307"/>
+                    <a:pt x="25350" y="1409076"/>
+                  </a:cubicBezTo>
+                  <a:cubicBezTo>
+                    <a:pt x="9119" y="1392844"/>
+                    <a:pt x="0" y="1370830"/>
+                    <a:pt x="0" y="1347875"/>
+                  </a:cubicBezTo>
+                  <a:lnTo>
+                    <a:pt x="0" y="86551"/>
+                  </a:lnTo>
+                  <a:cubicBezTo>
+                    <a:pt x="0" y="63596"/>
+                    <a:pt x="9119" y="41581"/>
+                    <a:pt x="25350" y="25350"/>
+                  </a:cubicBezTo>
+                  <a:cubicBezTo>
+                    <a:pt x="41581" y="9119"/>
+                    <a:pt x="63596" y="0"/>
+                    <a:pt x="86551" y="0"/>
+                  </a:cubicBezTo>
+                  <a:close/>
+                </a:path>
+              </a:pathLst>
+            </a:custGeom>
+            <a:solidFill>
+              <a:srgbClr val="FEC801"/>
+            </a:solidFill>
+          </p:spPr>
+          <p:txBody>
+            <a:bodyPr/>
+            <a:lstStyle/>
+            <a:p>
+              <a:endParaRPr lang="it-IT"/>
+            </a:p>
+          </p:txBody>
+        </p:sp>
+        <p:sp>
+          <p:nvSpPr>
+            <p:cNvPr id="11" name="TextBox 11">
+              <a:extLst>
+                <a:ext uri="{FF2B5EF4-FFF2-40B4-BE49-F238E27FC236}">
+                  <a16:creationId xmlns:a16="http://schemas.microsoft.com/office/drawing/2014/main" id="{EF78FB45-86FB-9377-5492-5DF4C62E59D8}"/>
+                </a:ext>
+              </a:extLst>
+            </p:cNvPr>
+            <p:cNvSpPr txBox="1"/>
+            <p:nvPr/>
+          </p:nvSpPr>
+          <p:spPr>
+            <a:xfrm>
+              <a:off x="0" y="9525"/>
+              <a:ext cx="1235036" cy="1424901"/>
+            </a:xfrm>
+            <a:prstGeom prst="rect">
+              <a:avLst/>
+            </a:prstGeom>
+          </p:spPr>
+          <p:txBody>
+            <a:bodyPr lIns="50800" tIns="50800" rIns="50800" bIns="50800" rtlCol="0" anchor="ctr"/>
+            <a:lstStyle/>
+            <a:p>
+              <a:pPr algn="ctr">
+                <a:lnSpc>
+                  <a:spcPts val="2200"/>
+                </a:lnSpc>
+              </a:pPr>
+              <a:endParaRPr/>
+            </a:p>
+          </p:txBody>
+        </p:sp>
+      </p:grpSp>
+      <p:grpSp>
+        <p:nvGrpSpPr>
+          <p:cNvPr id="12" name="Group 12">
+            <a:extLst>
+              <a:ext uri="{FF2B5EF4-FFF2-40B4-BE49-F238E27FC236}">
+                <a16:creationId xmlns:a16="http://schemas.microsoft.com/office/drawing/2014/main" id="{7C473A8A-B3AD-2789-7006-ED3DD3F32A76}"/>
+              </a:ext>
+            </a:extLst>
+          </p:cNvPr>
+          <p:cNvGrpSpPr/>
+          <p:nvPr/>
+        </p:nvGrpSpPr>
+        <p:grpSpPr>
+          <a:xfrm>
+            <a:off x="1558839" y="5673054"/>
+            <a:ext cx="4561929" cy="4406086"/>
+            <a:chOff x="0" y="0"/>
+            <a:chExt cx="1235036" cy="1434426"/>
+          </a:xfrm>
+        </p:grpSpPr>
+        <p:sp>
+          <p:nvSpPr>
+            <p:cNvPr id="13" name="Freeform 13">
+              <a:extLst>
+                <a:ext uri="{FF2B5EF4-FFF2-40B4-BE49-F238E27FC236}">
+                  <a16:creationId xmlns:a16="http://schemas.microsoft.com/office/drawing/2014/main" id="{F14ACEC1-FDCC-AB3C-151A-244950802013}"/>
+                </a:ext>
+              </a:extLst>
+            </p:cNvPr>
+            <p:cNvSpPr/>
+            <p:nvPr/>
+          </p:nvSpPr>
+          <p:spPr>
+            <a:xfrm>
+              <a:off x="0" y="0"/>
+              <a:ext cx="1235036" cy="1434426"/>
+            </a:xfrm>
+            <a:custGeom>
+              <a:avLst/>
+              <a:gdLst/>
+              <a:ahLst/>
+              <a:cxnLst/>
+              <a:rect l="l" t="t" r="r" b="b"/>
+              <a:pathLst>
+                <a:path w="1235036" h="1434426">
+                  <a:moveTo>
+                    <a:pt x="86551" y="0"/>
+                  </a:moveTo>
+                  <a:lnTo>
+                    <a:pt x="1148486" y="0"/>
+                  </a:lnTo>
+                  <a:cubicBezTo>
+                    <a:pt x="1196286" y="0"/>
+                    <a:pt x="1235036" y="38750"/>
+                    <a:pt x="1235036" y="86551"/>
+                  </a:cubicBezTo>
+                  <a:lnTo>
+                    <a:pt x="1235036" y="1347875"/>
+                  </a:lnTo>
+                  <a:cubicBezTo>
+                    <a:pt x="1235036" y="1395676"/>
+                    <a:pt x="1196286" y="1434426"/>
+                    <a:pt x="1148486" y="1434426"/>
+                  </a:cubicBezTo>
+                  <a:lnTo>
+                    <a:pt x="86551" y="1434426"/>
+                  </a:lnTo>
+                  <a:cubicBezTo>
+                    <a:pt x="63596" y="1434426"/>
+                    <a:pt x="41581" y="1425307"/>
+                    <a:pt x="25350" y="1409076"/>
+                  </a:cubicBezTo>
+                  <a:cubicBezTo>
+                    <a:pt x="9119" y="1392844"/>
+                    <a:pt x="0" y="1370830"/>
+                    <a:pt x="0" y="1347875"/>
+                  </a:cubicBezTo>
+                  <a:lnTo>
+                    <a:pt x="0" y="86551"/>
+                  </a:lnTo>
+                  <a:cubicBezTo>
+                    <a:pt x="0" y="63596"/>
+                    <a:pt x="9119" y="41581"/>
+                    <a:pt x="25350" y="25350"/>
+                  </a:cubicBezTo>
+                  <a:cubicBezTo>
+                    <a:pt x="41581" y="9119"/>
+                    <a:pt x="63596" y="0"/>
+                    <a:pt x="86551" y="0"/>
+                  </a:cubicBezTo>
+                  <a:close/>
+                </a:path>
+              </a:pathLst>
+            </a:custGeom>
+            <a:solidFill>
+              <a:srgbClr val="FFFFFF"/>
+            </a:solidFill>
+          </p:spPr>
+          <p:txBody>
+            <a:bodyPr/>
+            <a:lstStyle/>
+            <a:p>
+              <a:endParaRPr lang="it-IT"/>
+            </a:p>
+          </p:txBody>
+        </p:sp>
+        <p:sp>
+          <p:nvSpPr>
+            <p:cNvPr id="14" name="TextBox 14">
+              <a:extLst>
+                <a:ext uri="{FF2B5EF4-FFF2-40B4-BE49-F238E27FC236}">
+                  <a16:creationId xmlns:a16="http://schemas.microsoft.com/office/drawing/2014/main" id="{EC11D86E-CAF8-10F1-2342-DC7893876451}"/>
+                </a:ext>
+              </a:extLst>
+            </p:cNvPr>
+            <p:cNvSpPr txBox="1"/>
+            <p:nvPr/>
+          </p:nvSpPr>
+          <p:spPr>
+            <a:xfrm>
+              <a:off x="0" y="9525"/>
+              <a:ext cx="1235036" cy="1424901"/>
+            </a:xfrm>
+            <a:prstGeom prst="rect">
+              <a:avLst/>
+            </a:prstGeom>
+          </p:spPr>
+          <p:txBody>
+            <a:bodyPr lIns="50800" tIns="50800" rIns="50800" bIns="50800" rtlCol="0" anchor="ctr"/>
+            <a:lstStyle/>
+            <a:p>
+              <a:pPr algn="ctr">
+                <a:lnSpc>
+                  <a:spcPts val="2200"/>
+                </a:lnSpc>
+              </a:pPr>
+              <a:endParaRPr/>
+            </a:p>
+          </p:txBody>
+        </p:sp>
+      </p:grpSp>
+      <p:sp>
+        <p:nvSpPr>
+          <p:cNvPr id="15" name="TextBox 15">
+            <a:extLst>
+              <a:ext uri="{FF2B5EF4-FFF2-40B4-BE49-F238E27FC236}">
+                <a16:creationId xmlns:a16="http://schemas.microsoft.com/office/drawing/2014/main" id="{7B036BD9-94A4-68C6-DA1E-EAAA3D29132C}"/>
+              </a:ext>
+            </a:extLst>
+          </p:cNvPr>
+          <p:cNvSpPr txBox="1"/>
+          <p:nvPr/>
+        </p:nvSpPr>
+        <p:spPr>
+          <a:xfrm>
+            <a:off x="1738783" y="6027580"/>
+            <a:ext cx="4160643" cy="512961"/>
+          </a:xfrm>
+          <a:prstGeom prst="rect">
+            <a:avLst/>
+          </a:prstGeom>
+        </p:spPr>
+        <p:txBody>
+          <a:bodyPr lIns="0" tIns="0" rIns="0" bIns="0" rtlCol="0" anchor="t">
+            <a:spAutoFit/>
+          </a:bodyPr>
+          <a:lstStyle/>
+          <a:p>
+            <a:pPr algn="ctr">
+              <a:lnSpc>
+                <a:spcPts val="3999"/>
+              </a:lnSpc>
+            </a:pPr>
+            <a:r>
+              <a:rPr lang="en-US" sz="3999" dirty="0">
+                <a:solidFill>
+                  <a:srgbClr val="290606"/>
+                </a:solidFill>
+                <a:latin typeface="Cheddar"/>
+                <a:ea typeface="Cheddar"/>
+                <a:cs typeface="Cheddar"/>
+                <a:sym typeface="Cheddar"/>
+              </a:rPr>
+              <a:t>ResNet50</a:t>
+            </a:r>
+          </a:p>
+        </p:txBody>
+      </p:sp>
+      <p:grpSp>
+        <p:nvGrpSpPr>
+          <p:cNvPr id="16" name="Group 16">
+            <a:extLst>
+              <a:ext uri="{FF2B5EF4-FFF2-40B4-BE49-F238E27FC236}">
+                <a16:creationId xmlns:a16="http://schemas.microsoft.com/office/drawing/2014/main" id="{65BE2136-09AF-E0A0-DF91-8A8FB84CE943}"/>
+              </a:ext>
+            </a:extLst>
+          </p:cNvPr>
+          <p:cNvGrpSpPr/>
+          <p:nvPr/>
+        </p:nvGrpSpPr>
+        <p:grpSpPr>
+          <a:xfrm>
+            <a:off x="6543865" y="5673054"/>
+            <a:ext cx="4561929" cy="4406086"/>
+            <a:chOff x="0" y="0"/>
+            <a:chExt cx="1235036" cy="1434426"/>
+          </a:xfrm>
+        </p:grpSpPr>
+        <p:sp>
+          <p:nvSpPr>
+            <p:cNvPr id="17" name="Freeform 17">
+              <a:extLst>
+                <a:ext uri="{FF2B5EF4-FFF2-40B4-BE49-F238E27FC236}">
+                  <a16:creationId xmlns:a16="http://schemas.microsoft.com/office/drawing/2014/main" id="{A8B15243-473C-57C3-7565-E8F1C430AF30}"/>
+                </a:ext>
+              </a:extLst>
+            </p:cNvPr>
+            <p:cNvSpPr/>
+            <p:nvPr/>
+          </p:nvSpPr>
+          <p:spPr>
+            <a:xfrm>
+              <a:off x="0" y="0"/>
+              <a:ext cx="1235036" cy="1434426"/>
+            </a:xfrm>
+            <a:custGeom>
+              <a:avLst/>
+              <a:gdLst/>
+              <a:ahLst/>
+              <a:cxnLst/>
+              <a:rect l="l" t="t" r="r" b="b"/>
+              <a:pathLst>
+                <a:path w="1235036" h="1434426">
+                  <a:moveTo>
+                    <a:pt x="86551" y="0"/>
+                  </a:moveTo>
+                  <a:lnTo>
+                    <a:pt x="1148486" y="0"/>
+                  </a:lnTo>
+                  <a:cubicBezTo>
+                    <a:pt x="1196286" y="0"/>
+                    <a:pt x="1235036" y="38750"/>
+                    <a:pt x="1235036" y="86551"/>
+                  </a:cubicBezTo>
+                  <a:lnTo>
+                    <a:pt x="1235036" y="1347875"/>
+                  </a:lnTo>
+                  <a:cubicBezTo>
+                    <a:pt x="1235036" y="1395676"/>
+                    <a:pt x="1196286" y="1434426"/>
+                    <a:pt x="1148486" y="1434426"/>
+                  </a:cubicBezTo>
+                  <a:lnTo>
+                    <a:pt x="86551" y="1434426"/>
+                  </a:lnTo>
+                  <a:cubicBezTo>
+                    <a:pt x="63596" y="1434426"/>
+                    <a:pt x="41581" y="1425307"/>
+                    <a:pt x="25350" y="1409076"/>
+                  </a:cubicBezTo>
+                  <a:cubicBezTo>
+                    <a:pt x="9119" y="1392844"/>
+                    <a:pt x="0" y="1370830"/>
+                    <a:pt x="0" y="1347875"/>
+                  </a:cubicBezTo>
+                  <a:lnTo>
+                    <a:pt x="0" y="86551"/>
+                  </a:lnTo>
+                  <a:cubicBezTo>
+                    <a:pt x="0" y="63596"/>
+                    <a:pt x="9119" y="41581"/>
+                    <a:pt x="25350" y="25350"/>
+                  </a:cubicBezTo>
+                  <a:cubicBezTo>
+                    <a:pt x="41581" y="9119"/>
+                    <a:pt x="63596" y="0"/>
+                    <a:pt x="86551" y="0"/>
+                  </a:cubicBezTo>
+                  <a:close/>
+                </a:path>
+              </a:pathLst>
+            </a:custGeom>
+            <a:solidFill>
+              <a:srgbClr val="FFFFFF"/>
+            </a:solidFill>
+          </p:spPr>
+          <p:txBody>
+            <a:bodyPr/>
+            <a:lstStyle/>
+            <a:p>
+              <a:endParaRPr lang="it-IT"/>
+            </a:p>
+          </p:txBody>
+        </p:sp>
+        <p:sp>
+          <p:nvSpPr>
+            <p:cNvPr id="18" name="TextBox 18">
+              <a:extLst>
+                <a:ext uri="{FF2B5EF4-FFF2-40B4-BE49-F238E27FC236}">
+                  <a16:creationId xmlns:a16="http://schemas.microsoft.com/office/drawing/2014/main" id="{2998C201-0AAB-240B-C47B-414322363CFC}"/>
+                </a:ext>
+              </a:extLst>
+            </p:cNvPr>
+            <p:cNvSpPr txBox="1"/>
+            <p:nvPr/>
+          </p:nvSpPr>
+          <p:spPr>
+            <a:xfrm>
+              <a:off x="0" y="9525"/>
+              <a:ext cx="1235036" cy="1424901"/>
+            </a:xfrm>
+            <a:prstGeom prst="rect">
+              <a:avLst/>
+            </a:prstGeom>
+          </p:spPr>
+          <p:txBody>
+            <a:bodyPr lIns="50800" tIns="50800" rIns="50800" bIns="50800" rtlCol="0" anchor="ctr"/>
+            <a:lstStyle/>
+            <a:p>
+              <a:pPr algn="ctr">
+                <a:lnSpc>
+                  <a:spcPts val="2200"/>
+                </a:lnSpc>
+              </a:pPr>
+              <a:endParaRPr/>
+            </a:p>
+          </p:txBody>
+        </p:sp>
+      </p:grpSp>
+      <p:sp>
+        <p:nvSpPr>
+          <p:cNvPr id="19" name="TextBox 19">
+            <a:extLst>
+              <a:ext uri="{FF2B5EF4-FFF2-40B4-BE49-F238E27FC236}">
+                <a16:creationId xmlns:a16="http://schemas.microsoft.com/office/drawing/2014/main" id="{05DDA428-2B8C-C21A-A4AC-3D7AE87C7690}"/>
+              </a:ext>
+            </a:extLst>
+          </p:cNvPr>
+          <p:cNvSpPr txBox="1"/>
+          <p:nvPr/>
+        </p:nvSpPr>
+        <p:spPr>
+          <a:xfrm>
+            <a:off x="6740774" y="6027580"/>
+            <a:ext cx="4160643" cy="512961"/>
+          </a:xfrm>
+          <a:prstGeom prst="rect">
+            <a:avLst/>
+          </a:prstGeom>
+        </p:spPr>
+        <p:txBody>
+          <a:bodyPr lIns="0" tIns="0" rIns="0" bIns="0" rtlCol="0" anchor="t">
+            <a:spAutoFit/>
+          </a:bodyPr>
+          <a:lstStyle/>
+          <a:p>
+            <a:pPr algn="ctr">
+              <a:lnSpc>
+                <a:spcPts val="3999"/>
+              </a:lnSpc>
+            </a:pPr>
+            <a:r>
+              <a:rPr lang="en-US" sz="3999" dirty="0">
+                <a:solidFill>
+                  <a:srgbClr val="290606"/>
+                </a:solidFill>
+                <a:latin typeface="Cheddar"/>
+                <a:ea typeface="Cheddar"/>
+                <a:cs typeface="Cheddar"/>
+                <a:sym typeface="Cheddar"/>
+              </a:rPr>
+              <a:t>WEIGHTS='IMAGENET'</a:t>
+            </a:r>
+          </a:p>
+        </p:txBody>
+      </p:sp>
+      <p:grpSp>
+        <p:nvGrpSpPr>
+          <p:cNvPr id="20" name="Group 20">
+            <a:extLst>
+              <a:ext uri="{FF2B5EF4-FFF2-40B4-BE49-F238E27FC236}">
+                <a16:creationId xmlns:a16="http://schemas.microsoft.com/office/drawing/2014/main" id="{7EAE604E-8953-7602-B7FB-B6ECEED1EFAB}"/>
+              </a:ext>
+            </a:extLst>
+          </p:cNvPr>
+          <p:cNvGrpSpPr/>
+          <p:nvPr/>
+        </p:nvGrpSpPr>
+        <p:grpSpPr>
+          <a:xfrm>
+            <a:off x="11531889" y="5673054"/>
+            <a:ext cx="4561929" cy="4406086"/>
+            <a:chOff x="0" y="0"/>
+            <a:chExt cx="1235036" cy="1434426"/>
+          </a:xfrm>
+        </p:grpSpPr>
+        <p:sp>
+          <p:nvSpPr>
+            <p:cNvPr id="21" name="Freeform 21">
+              <a:extLst>
+                <a:ext uri="{FF2B5EF4-FFF2-40B4-BE49-F238E27FC236}">
+                  <a16:creationId xmlns:a16="http://schemas.microsoft.com/office/drawing/2014/main" id="{C9AD89AC-89E5-C6DC-7457-777BD07F65ED}"/>
+                </a:ext>
+              </a:extLst>
+            </p:cNvPr>
+            <p:cNvSpPr/>
+            <p:nvPr/>
+          </p:nvSpPr>
+          <p:spPr>
+            <a:xfrm>
+              <a:off x="0" y="0"/>
+              <a:ext cx="1235036" cy="1434426"/>
+            </a:xfrm>
+            <a:custGeom>
+              <a:avLst/>
+              <a:gdLst/>
+              <a:ahLst/>
+              <a:cxnLst/>
+              <a:rect l="l" t="t" r="r" b="b"/>
+              <a:pathLst>
+                <a:path w="1235036" h="1434426">
+                  <a:moveTo>
+                    <a:pt x="86551" y="0"/>
+                  </a:moveTo>
+                  <a:lnTo>
+                    <a:pt x="1148486" y="0"/>
+                  </a:lnTo>
+                  <a:cubicBezTo>
+                    <a:pt x="1196286" y="0"/>
+                    <a:pt x="1235036" y="38750"/>
+                    <a:pt x="1235036" y="86551"/>
+                  </a:cubicBezTo>
+                  <a:lnTo>
+                    <a:pt x="1235036" y="1347875"/>
+                  </a:lnTo>
+                  <a:cubicBezTo>
+                    <a:pt x="1235036" y="1395676"/>
+                    <a:pt x="1196286" y="1434426"/>
+                    <a:pt x="1148486" y="1434426"/>
+                  </a:cubicBezTo>
+                  <a:lnTo>
+                    <a:pt x="86551" y="1434426"/>
+                  </a:lnTo>
+                  <a:cubicBezTo>
+                    <a:pt x="63596" y="1434426"/>
+                    <a:pt x="41581" y="1425307"/>
+                    <a:pt x="25350" y="1409076"/>
+                  </a:cubicBezTo>
+                  <a:cubicBezTo>
+                    <a:pt x="9119" y="1392844"/>
+                    <a:pt x="0" y="1370830"/>
+                    <a:pt x="0" y="1347875"/>
+                  </a:cubicBezTo>
+                  <a:lnTo>
+                    <a:pt x="0" y="86551"/>
+                  </a:lnTo>
+                  <a:cubicBezTo>
+                    <a:pt x="0" y="63596"/>
+                    <a:pt x="9119" y="41581"/>
+                    <a:pt x="25350" y="25350"/>
+                  </a:cubicBezTo>
+                  <a:cubicBezTo>
+                    <a:pt x="41581" y="9119"/>
+                    <a:pt x="63596" y="0"/>
+                    <a:pt x="86551" y="0"/>
+                  </a:cubicBezTo>
+                  <a:close/>
+                </a:path>
+              </a:pathLst>
+            </a:custGeom>
+            <a:solidFill>
+              <a:srgbClr val="FFFFFF"/>
+            </a:solidFill>
+          </p:spPr>
+          <p:txBody>
+            <a:bodyPr/>
+            <a:lstStyle/>
+            <a:p>
+              <a:endParaRPr lang="it-IT"/>
+            </a:p>
+          </p:txBody>
+        </p:sp>
+        <p:sp>
+          <p:nvSpPr>
+            <p:cNvPr id="22" name="TextBox 22">
+              <a:extLst>
+                <a:ext uri="{FF2B5EF4-FFF2-40B4-BE49-F238E27FC236}">
+                  <a16:creationId xmlns:a16="http://schemas.microsoft.com/office/drawing/2014/main" id="{A143B28B-E32E-DD9C-66F6-0B8ECD671720}"/>
+                </a:ext>
+              </a:extLst>
+            </p:cNvPr>
+            <p:cNvSpPr txBox="1"/>
+            <p:nvPr/>
+          </p:nvSpPr>
+          <p:spPr>
+            <a:xfrm>
+              <a:off x="0" y="9525"/>
+              <a:ext cx="1235036" cy="1424901"/>
+            </a:xfrm>
+            <a:prstGeom prst="rect">
+              <a:avLst/>
+            </a:prstGeom>
+          </p:spPr>
+          <p:txBody>
+            <a:bodyPr lIns="50800" tIns="50800" rIns="50800" bIns="50800" rtlCol="0" anchor="ctr"/>
+            <a:lstStyle/>
+            <a:p>
+              <a:pPr algn="ctr">
+                <a:lnSpc>
+                  <a:spcPts val="2200"/>
+                </a:lnSpc>
+              </a:pPr>
+              <a:endParaRPr/>
+            </a:p>
+          </p:txBody>
+        </p:sp>
+      </p:grpSp>
+      <p:sp>
+        <p:nvSpPr>
+          <p:cNvPr id="23" name="TextBox 23">
+            <a:extLst>
+              <a:ext uri="{FF2B5EF4-FFF2-40B4-BE49-F238E27FC236}">
+                <a16:creationId xmlns:a16="http://schemas.microsoft.com/office/drawing/2014/main" id="{F13FCFA5-C5A9-96D7-9250-748288671592}"/>
+              </a:ext>
+            </a:extLst>
+          </p:cNvPr>
+          <p:cNvSpPr txBox="1"/>
+          <p:nvPr/>
+        </p:nvSpPr>
+        <p:spPr>
+          <a:xfrm>
+            <a:off x="11725799" y="6027580"/>
+            <a:ext cx="4160643" cy="512961"/>
+          </a:xfrm>
+          <a:prstGeom prst="rect">
+            <a:avLst/>
+          </a:prstGeom>
+        </p:spPr>
+        <p:txBody>
+          <a:bodyPr lIns="0" tIns="0" rIns="0" bIns="0" rtlCol="0" anchor="t">
+            <a:spAutoFit/>
+          </a:bodyPr>
+          <a:lstStyle/>
+          <a:p>
+            <a:pPr algn="ctr">
+              <a:lnSpc>
+                <a:spcPts val="3999"/>
+              </a:lnSpc>
+            </a:pPr>
+            <a:r>
+              <a:rPr lang="en-US" sz="3999" dirty="0">
+                <a:solidFill>
+                  <a:srgbClr val="290606"/>
+                </a:solidFill>
+                <a:latin typeface="Cheddar"/>
+                <a:ea typeface="Cheddar"/>
+                <a:cs typeface="Cheddar"/>
+                <a:sym typeface="Cheddar"/>
+              </a:rPr>
+              <a:t>FINE TUNING</a:t>
+            </a:r>
+          </a:p>
+        </p:txBody>
+      </p:sp>
+      <p:sp>
+        <p:nvSpPr>
+          <p:cNvPr id="24" name="TextBox 24">
+            <a:extLst>
+              <a:ext uri="{FF2B5EF4-FFF2-40B4-BE49-F238E27FC236}">
+                <a16:creationId xmlns:a16="http://schemas.microsoft.com/office/drawing/2014/main" id="{8535C6DF-2927-133B-A1E7-D8B94333699A}"/>
+              </a:ext>
+            </a:extLst>
+          </p:cNvPr>
+          <p:cNvSpPr txBox="1"/>
+          <p:nvPr/>
+        </p:nvSpPr>
+        <p:spPr>
+          <a:xfrm>
+            <a:off x="1558838" y="6543036"/>
+            <a:ext cx="4568662" cy="2715487"/>
+          </a:xfrm>
+          <a:prstGeom prst="rect">
+            <a:avLst/>
+          </a:prstGeom>
+        </p:spPr>
+        <p:txBody>
+          <a:bodyPr wrap="square" lIns="0" tIns="0" rIns="0" bIns="0" rtlCol="0" anchor="t">
+            <a:spAutoFit/>
+          </a:bodyPr>
+          <a:lstStyle/>
+          <a:p>
+            <a:pPr marL="280672" lvl="1" algn="l">
+              <a:lnSpc>
+                <a:spcPts val="3640"/>
+              </a:lnSpc>
+            </a:pPr>
+            <a:r>
+              <a:rPr lang="it-IT" dirty="0">
+                <a:solidFill>
+                  <a:srgbClr val="290606"/>
+                </a:solidFill>
+                <a:latin typeface="Telegraf"/>
+                <a:ea typeface="Telegraf"/>
+                <a:cs typeface="Telegraf"/>
+                <a:sym typeface="Telegraf"/>
+              </a:rPr>
+              <a:t>ResNet50 è un tipo specifico di rete neurale convoluzionale (CNN).</a:t>
+            </a:r>
+          </a:p>
+          <a:p>
+            <a:pPr marL="280672" lvl="1" algn="l">
+              <a:lnSpc>
+                <a:spcPts val="3640"/>
+              </a:lnSpc>
+            </a:pPr>
+            <a:r>
+              <a:rPr lang="it-IT" dirty="0">
+                <a:solidFill>
+                  <a:srgbClr val="290606"/>
+                </a:solidFill>
+                <a:latin typeface="Telegraf"/>
+                <a:ea typeface="Telegraf"/>
+                <a:cs typeface="Telegraf"/>
+                <a:sym typeface="Telegraf"/>
+              </a:rPr>
+              <a:t> Analizza un'immagine pixel per pixel, identificando gradualmente caratteristiche sempre più complesse, come bordi, forme e infine oggetti interi.</a:t>
+            </a:r>
+            <a:endParaRPr lang="en-US" dirty="0">
+              <a:solidFill>
+                <a:srgbClr val="290606"/>
+              </a:solidFill>
+              <a:latin typeface="Telegraf"/>
+              <a:ea typeface="Telegraf"/>
+              <a:cs typeface="Telegraf"/>
+              <a:sym typeface="Telegraf"/>
+            </a:endParaRPr>
+          </a:p>
+        </p:txBody>
+      </p:sp>
+      <p:pic>
+        <p:nvPicPr>
+          <p:cNvPr id="27" name="Immagine 26">
+            <a:extLst>
+              <a:ext uri="{FF2B5EF4-FFF2-40B4-BE49-F238E27FC236}">
+                <a16:creationId xmlns:a16="http://schemas.microsoft.com/office/drawing/2014/main" id="{2A0291B0-2ECD-68A2-66CF-D82E9E19F45C}"/>
+              </a:ext>
+            </a:extLst>
+          </p:cNvPr>
+          <p:cNvPicPr>
+            <a:picLocks noChangeAspect="1"/>
+          </p:cNvPicPr>
+          <p:nvPr/>
+        </p:nvPicPr>
+        <p:blipFill>
+          <a:blip r:embed="rId3">
+            <a:extLst>
+              <a:ext uri="{28A0092B-C50C-407E-A947-70E740481C1C}">
+                <a14:useLocalDpi xmlns:a14="http://schemas.microsoft.com/office/drawing/2010/main" val="0"/>
+              </a:ext>
+            </a:extLst>
+          </a:blip>
+          <a:srcRect/>
+          <a:stretch/>
+        </p:blipFill>
+        <p:spPr>
+          <a:xfrm>
+            <a:off x="1608744" y="1792782"/>
+            <a:ext cx="5491210" cy="3385117"/>
+          </a:xfrm>
+          <a:prstGeom prst="rect">
+            <a:avLst/>
+          </a:prstGeom>
+        </p:spPr>
+      </p:pic>
+      <p:sp>
+        <p:nvSpPr>
+          <p:cNvPr id="28" name="TextBox 24">
+            <a:extLst>
+              <a:ext uri="{FF2B5EF4-FFF2-40B4-BE49-F238E27FC236}">
+                <a16:creationId xmlns:a16="http://schemas.microsoft.com/office/drawing/2014/main" id="{DFA20A86-0365-51B1-ADD9-C15B69084C65}"/>
+              </a:ext>
+            </a:extLst>
+          </p:cNvPr>
+          <p:cNvSpPr txBox="1"/>
+          <p:nvPr/>
+        </p:nvSpPr>
+        <p:spPr>
+          <a:xfrm>
+            <a:off x="6550597" y="6559221"/>
+            <a:ext cx="4561928" cy="3177152"/>
+          </a:xfrm>
+          <a:prstGeom prst="rect">
+            <a:avLst/>
+          </a:prstGeom>
+        </p:spPr>
+        <p:txBody>
+          <a:bodyPr wrap="square" lIns="0" tIns="0" rIns="0" bIns="0" rtlCol="0" anchor="t">
+            <a:spAutoFit/>
+          </a:bodyPr>
+          <a:lstStyle/>
+          <a:p>
+            <a:pPr marL="280672" lvl="1" algn="l">
+              <a:lnSpc>
+                <a:spcPts val="3640"/>
+              </a:lnSpc>
+            </a:pPr>
+            <a:r>
+              <a:rPr lang="it-IT" noProof="1">
+                <a:solidFill>
+                  <a:srgbClr val="290606"/>
+                </a:solidFill>
+                <a:latin typeface="Telegraf" panose="020B0604020202020204" charset="0"/>
+                <a:ea typeface="Telegraf"/>
+                <a:cs typeface="Telegraf"/>
+                <a:sym typeface="Telegraf"/>
+              </a:rPr>
+              <a:t> I pesi iniziali della rete usata sono stati pre-allenati su un vasto dataset di immagini chiamato ImageNet.</a:t>
+            </a:r>
+            <a:br>
+              <a:rPr lang="it-IT" noProof="1">
+                <a:solidFill>
+                  <a:srgbClr val="290606"/>
+                </a:solidFill>
+                <a:latin typeface="Telegraf" panose="020B0604020202020204" charset="0"/>
+                <a:ea typeface="Telegraf"/>
+                <a:cs typeface="Telegraf"/>
+                <a:sym typeface="Telegraf"/>
+              </a:rPr>
+            </a:br>
+            <a:r>
+              <a:rPr lang="it-IT" noProof="1">
+                <a:solidFill>
+                  <a:srgbClr val="290606"/>
+                </a:solidFill>
+                <a:latin typeface="Telegraf" panose="020B0604020202020204" charset="0"/>
+                <a:ea typeface="Telegraf"/>
+                <a:cs typeface="Telegraf"/>
+                <a:sym typeface="Telegraf"/>
+              </a:rPr>
+              <a:t>Si e’ deciso di «freezare» dunque i pesi della rete convoluzionale poiche’ si riteneva che questi ultimi fossero gia’ piu’ che buoni per estrarre feature.</a:t>
+            </a:r>
+          </a:p>
+        </p:txBody>
+      </p:sp>
+      <p:sp>
+        <p:nvSpPr>
+          <p:cNvPr id="29" name="TextBox 24">
+            <a:extLst>
+              <a:ext uri="{FF2B5EF4-FFF2-40B4-BE49-F238E27FC236}">
+                <a16:creationId xmlns:a16="http://schemas.microsoft.com/office/drawing/2014/main" id="{CA1D2A91-EE6D-5070-B96F-A92FB74B04D4}"/>
+              </a:ext>
+            </a:extLst>
+          </p:cNvPr>
+          <p:cNvSpPr txBox="1"/>
+          <p:nvPr/>
+        </p:nvSpPr>
+        <p:spPr>
+          <a:xfrm>
+            <a:off x="11538618" y="6559221"/>
+            <a:ext cx="4555200" cy="2722284"/>
+          </a:xfrm>
+          <a:prstGeom prst="rect">
+            <a:avLst/>
+          </a:prstGeom>
+        </p:spPr>
+        <p:txBody>
+          <a:bodyPr wrap="square" lIns="0" tIns="0" rIns="0" bIns="0" rtlCol="0" anchor="t">
+            <a:spAutoFit/>
+          </a:bodyPr>
+          <a:lstStyle/>
+          <a:p>
+            <a:pPr marL="280672" lvl="1" algn="l">
+              <a:lnSpc>
+                <a:spcPts val="3640"/>
+              </a:lnSpc>
+            </a:pPr>
+            <a:r>
+              <a:rPr lang="it-IT" sz="2000" dirty="0">
+                <a:solidFill>
+                  <a:srgbClr val="290606"/>
+                </a:solidFill>
+                <a:latin typeface="Telegraf"/>
+                <a:ea typeface="Telegraf"/>
+                <a:cs typeface="Telegraf"/>
+                <a:sym typeface="Telegraf"/>
+              </a:rPr>
+              <a:t>È una tecnica nel machine learning che consiste nell'adattare un modello </a:t>
+            </a:r>
+            <a:r>
+              <a:rPr lang="it-IT" sz="2000" dirty="0" err="1">
+                <a:solidFill>
+                  <a:srgbClr val="290606"/>
+                </a:solidFill>
+                <a:latin typeface="Telegraf"/>
+                <a:ea typeface="Telegraf"/>
+                <a:cs typeface="Telegraf"/>
+                <a:sym typeface="Telegraf"/>
+              </a:rPr>
+              <a:t>pre</a:t>
+            </a:r>
+            <a:r>
+              <a:rPr lang="it-IT" sz="2000" dirty="0">
+                <a:solidFill>
+                  <a:srgbClr val="290606"/>
+                </a:solidFill>
+                <a:latin typeface="Telegraf"/>
+                <a:ea typeface="Telegraf"/>
+                <a:cs typeface="Telegraf"/>
+                <a:sym typeface="Telegraf"/>
+              </a:rPr>
+              <a:t>-addestrato su un dataset a un compito più specifico.</a:t>
+            </a:r>
+            <a:br>
+              <a:rPr lang="it-IT" sz="2000" dirty="0">
+                <a:solidFill>
+                  <a:srgbClr val="290606"/>
+                </a:solidFill>
+                <a:latin typeface="Telegraf"/>
+                <a:ea typeface="Telegraf"/>
+                <a:cs typeface="Telegraf"/>
+                <a:sym typeface="Telegraf"/>
+              </a:rPr>
+            </a:br>
+            <a:r>
+              <a:rPr lang="it-IT" sz="2000" dirty="0">
+                <a:solidFill>
+                  <a:srgbClr val="290606"/>
+                </a:solidFill>
+                <a:latin typeface="Telegraf"/>
+                <a:ea typeface="Telegraf"/>
+                <a:cs typeface="Telegraf"/>
+                <a:sym typeface="Telegraf"/>
+              </a:rPr>
+              <a:t>In questo contesto, si tratta proprio della predizione BMI.</a:t>
+            </a:r>
+            <a:endParaRPr lang="en-US" sz="2000" dirty="0">
+              <a:solidFill>
+                <a:srgbClr val="290606"/>
+              </a:solidFill>
+              <a:latin typeface="Telegraf"/>
+              <a:ea typeface="Telegraf"/>
+              <a:cs typeface="Telegraf"/>
+              <a:sym typeface="Telegraf"/>
+            </a:endParaRPr>
+          </a:p>
+        </p:txBody>
+      </p:sp>
+      <p:pic>
+        <p:nvPicPr>
+          <p:cNvPr id="25" name="Immagine 24">
+            <a:extLst>
+              <a:ext uri="{FF2B5EF4-FFF2-40B4-BE49-F238E27FC236}">
+                <a16:creationId xmlns:a16="http://schemas.microsoft.com/office/drawing/2014/main" id="{D129DF05-E822-62F4-3DDE-A85709B699BF}"/>
+              </a:ext>
+            </a:extLst>
+          </p:cNvPr>
+          <p:cNvPicPr>
+            <a:picLocks noChangeAspect="1"/>
+          </p:cNvPicPr>
+          <p:nvPr/>
+        </p:nvPicPr>
+        <p:blipFill>
+          <a:blip r:embed="rId4">
+            <a:extLst>
+              <a:ext uri="{28A0092B-C50C-407E-A947-70E740481C1C}">
+                <a14:useLocalDpi xmlns:a14="http://schemas.microsoft.com/office/drawing/2010/main" val="0"/>
+              </a:ext>
+            </a:extLst>
+          </a:blip>
+          <a:srcRect/>
+          <a:stretch/>
+        </p:blipFill>
+        <p:spPr>
+          <a:xfrm>
+            <a:off x="7772400" y="2091306"/>
+            <a:ext cx="9995594" cy="2781989"/>
+          </a:xfrm>
+          <a:prstGeom prst="rect">
+            <a:avLst/>
+          </a:prstGeom>
+        </p:spPr>
+      </p:pic>
+    </p:spTree>
+    <p:extLst>
+      <p:ext uri="{BB962C8B-B14F-4D97-AF65-F5344CB8AC3E}">
+        <p14:creationId xmlns:p14="http://schemas.microsoft.com/office/powerpoint/2010/main" val="1869456142"/>
+      </p:ext>
+    </p:extLst>
+  </p:cSld>
+  <p:clrMapOvr>
+    <a:masterClrMapping/>
+  </p:clrMapOvr>
+</p:sld>
+</file>
+
+<file path=ppt/slides/slide15.xml><?xml version="1.0" encoding="utf-8"?>
+<p:sld xmlns:a="http://schemas.openxmlformats.org/drawingml/2006/main" xmlns:r="http://schemas.openxmlformats.org/officeDocument/2006/relationships" xmlns:p="http://schemas.openxmlformats.org/presentationml/2006/main">
+  <p:cSld>
+    <p:bg>
+      <p:bgPr>
+        <a:solidFill>
+          <a:srgbClr val="EEF4F3"/>
+        </a:solidFill>
+        <a:effectLst/>
+      </p:bgPr>
+    </p:bg>
+    <p:spTree>
+      <p:nvGrpSpPr>
+        <p:cNvPr id="1" name="">
+          <a:extLst>
+            <a:ext uri="{FF2B5EF4-FFF2-40B4-BE49-F238E27FC236}">
+              <a16:creationId xmlns:a16="http://schemas.microsoft.com/office/drawing/2014/main" id="{91E9772A-8841-E962-6967-5E2D08C0E347}"/>
+            </a:ext>
+          </a:extLst>
+        </p:cNvPr>
+        <p:cNvGrpSpPr/>
+        <p:nvPr/>
+      </p:nvGrpSpPr>
+      <p:grpSpPr>
+        <a:xfrm>
+          <a:off x="0" y="0"/>
+          <a:ext cx="0" cy="0"/>
+          <a:chOff x="0" y="0"/>
+          <a:chExt cx="0" cy="0"/>
+        </a:xfrm>
+      </p:grpSpPr>
+      <p:pic>
+        <p:nvPicPr>
+          <p:cNvPr id="12" name="Immagine 11">
+            <a:extLst>
+              <a:ext uri="{FF2B5EF4-FFF2-40B4-BE49-F238E27FC236}">
+                <a16:creationId xmlns:a16="http://schemas.microsoft.com/office/drawing/2014/main" id="{840E4B7D-66BD-D4D7-5A01-5A3187FC67C8}"/>
+              </a:ext>
+            </a:extLst>
+          </p:cNvPr>
+          <p:cNvPicPr>
+            <a:picLocks noChangeAspect="1"/>
+          </p:cNvPicPr>
+          <p:nvPr/>
+        </p:nvPicPr>
+        <p:blipFill>
+          <a:blip r:embed="rId2">
+            <a:extLst>
+              <a:ext uri="{28A0092B-C50C-407E-A947-70E740481C1C}">
+                <a14:useLocalDpi xmlns:a14="http://schemas.microsoft.com/office/drawing/2010/main" val="0"/>
+              </a:ext>
+            </a:extLst>
+          </a:blip>
+          <a:stretch>
+            <a:fillRect/>
+          </a:stretch>
+        </p:blipFill>
+        <p:spPr>
+          <a:xfrm>
+            <a:off x="2055867" y="6484092"/>
+            <a:ext cx="5031097" cy="3457855"/>
+          </a:xfrm>
+          <a:prstGeom prst="rect">
+            <a:avLst/>
+          </a:prstGeom>
+        </p:spPr>
+      </p:pic>
+      <p:sp>
+        <p:nvSpPr>
+          <p:cNvPr id="2" name="TextBox 2">
+            <a:extLst>
+              <a:ext uri="{FF2B5EF4-FFF2-40B4-BE49-F238E27FC236}">
+                <a16:creationId xmlns:a16="http://schemas.microsoft.com/office/drawing/2014/main" id="{51DAF17C-CA1A-E842-928A-0B3B4C299828}"/>
+              </a:ext>
+            </a:extLst>
+          </p:cNvPr>
+          <p:cNvSpPr txBox="1"/>
+          <p:nvPr/>
+        </p:nvSpPr>
+        <p:spPr>
+          <a:xfrm>
+            <a:off x="5086350" y="800100"/>
+            <a:ext cx="8115300" cy="1795363"/>
+          </a:xfrm>
+          <a:prstGeom prst="rect">
+            <a:avLst/>
+          </a:prstGeom>
+        </p:spPr>
+        <p:txBody>
+          <a:bodyPr lIns="0" tIns="0" rIns="0" bIns="0" rtlCol="0" anchor="t">
+            <a:spAutoFit/>
+          </a:bodyPr>
+          <a:lstStyle/>
+          <a:p>
+            <a:pPr algn="ctr">
+              <a:lnSpc>
+                <a:spcPts val="6999"/>
+              </a:lnSpc>
+            </a:pPr>
+            <a:r>
+              <a:rPr lang="it-IT" sz="6999" spc="342" dirty="0">
+                <a:solidFill>
+                  <a:srgbClr val="290606"/>
+                </a:solidFill>
+                <a:latin typeface="Cheddar"/>
+                <a:ea typeface="Cheddar"/>
+                <a:cs typeface="Cheddar"/>
+                <a:sym typeface="Cheddar"/>
+              </a:rPr>
+              <a:t>CONFRONTO FINALE IDEA 6 &amp; 10</a:t>
+            </a:r>
+          </a:p>
+        </p:txBody>
+      </p:sp>
+      <p:pic>
+        <p:nvPicPr>
+          <p:cNvPr id="6" name="Immagine 5" descr="Immagine che contiene testo, schermata, Carattere&#10;&#10;Descrizione generata automaticamente">
+            <a:extLst>
+              <a:ext uri="{FF2B5EF4-FFF2-40B4-BE49-F238E27FC236}">
+                <a16:creationId xmlns:a16="http://schemas.microsoft.com/office/drawing/2014/main" id="{D89C5E54-D58B-BB36-D2E3-F91FC68DB0E1}"/>
+              </a:ext>
+            </a:extLst>
+          </p:cNvPr>
+          <p:cNvPicPr>
+            <a:picLocks noChangeAspect="1"/>
+          </p:cNvPicPr>
+          <p:nvPr/>
+        </p:nvPicPr>
+        <p:blipFill>
+          <a:blip r:embed="rId3">
+            <a:extLst>
+              <a:ext uri="{28A0092B-C50C-407E-A947-70E740481C1C}">
+                <a14:useLocalDpi xmlns:a14="http://schemas.microsoft.com/office/drawing/2010/main" val="0"/>
+              </a:ext>
+            </a:extLst>
+          </a:blip>
+          <a:stretch>
+            <a:fillRect/>
+          </a:stretch>
+        </p:blipFill>
+        <p:spPr>
+          <a:xfrm>
+            <a:off x="1638238" y="3232857"/>
+            <a:ext cx="5866357" cy="2825043"/>
+          </a:xfrm>
+          <a:prstGeom prst="rect">
+            <a:avLst/>
+          </a:prstGeom>
+        </p:spPr>
+      </p:pic>
+      <p:pic>
+        <p:nvPicPr>
+          <p:cNvPr id="8" name="Immagine 7" descr="Immagine che contiene testo, schermata, Carattere&#10;&#10;Descrizione generata automaticamente">
+            <a:extLst>
+              <a:ext uri="{FF2B5EF4-FFF2-40B4-BE49-F238E27FC236}">
+                <a16:creationId xmlns:a16="http://schemas.microsoft.com/office/drawing/2014/main" id="{353EC67E-D369-C57B-9C4C-D5DBB673B6DA}"/>
+              </a:ext>
+            </a:extLst>
+          </p:cNvPr>
+          <p:cNvPicPr>
+            <a:picLocks noChangeAspect="1"/>
+          </p:cNvPicPr>
+          <p:nvPr/>
+        </p:nvPicPr>
+        <p:blipFill>
+          <a:blip r:embed="rId4">
+            <a:extLst>
+              <a:ext uri="{28A0092B-C50C-407E-A947-70E740481C1C}">
+                <a14:useLocalDpi xmlns:a14="http://schemas.microsoft.com/office/drawing/2010/main" val="0"/>
+              </a:ext>
+            </a:extLst>
+          </a:blip>
+          <a:stretch>
+            <a:fillRect/>
+          </a:stretch>
+        </p:blipFill>
+        <p:spPr>
+          <a:xfrm>
+            <a:off x="10783406" y="3232857"/>
+            <a:ext cx="5866357" cy="2819851"/>
+          </a:xfrm>
+          <a:prstGeom prst="rect">
+            <a:avLst/>
+          </a:prstGeom>
+        </p:spPr>
+      </p:pic>
+      <p:sp>
+        <p:nvSpPr>
+          <p:cNvPr id="9" name="TextBox 24">
+            <a:extLst>
+              <a:ext uri="{FF2B5EF4-FFF2-40B4-BE49-F238E27FC236}">
+                <a16:creationId xmlns:a16="http://schemas.microsoft.com/office/drawing/2014/main" id="{F6C56CD7-7C69-6E41-BFDA-19F221E67D68}"/>
+              </a:ext>
+            </a:extLst>
+          </p:cNvPr>
+          <p:cNvSpPr txBox="1"/>
+          <p:nvPr/>
+        </p:nvSpPr>
+        <p:spPr>
+          <a:xfrm>
+            <a:off x="2437815" y="6051529"/>
+            <a:ext cx="4267200" cy="407163"/>
+          </a:xfrm>
+          <a:prstGeom prst="rect">
+            <a:avLst/>
+          </a:prstGeom>
+        </p:spPr>
+        <p:txBody>
+          <a:bodyPr wrap="square" lIns="0" tIns="0" rIns="0" bIns="0" rtlCol="0" anchor="t">
+            <a:spAutoFit/>
+          </a:bodyPr>
+          <a:lstStyle/>
+          <a:p>
+            <a:pPr marL="280672" lvl="1" algn="ctr">
+              <a:lnSpc>
+                <a:spcPts val="3640"/>
+              </a:lnSpc>
+            </a:pPr>
+            <a:r>
+              <a:rPr lang="it-IT" dirty="0">
+                <a:solidFill>
+                  <a:srgbClr val="290606"/>
+                </a:solidFill>
+                <a:latin typeface="Telegraf"/>
+                <a:ea typeface="Telegraf"/>
+                <a:cs typeface="Telegraf"/>
+                <a:sym typeface="Telegraf"/>
+              </a:rPr>
+              <a:t>IDEA 6 (</a:t>
+            </a:r>
+            <a:r>
+              <a:rPr lang="en-US" sz="1800" dirty="0">
+                <a:latin typeface="Telegraf" panose="020B0604020202020204" charset="0"/>
+                <a:ea typeface="Telegraf Bold"/>
+                <a:cs typeface="Telegraf Bold"/>
+                <a:sym typeface="Telegraf Bold"/>
+              </a:rPr>
+              <a:t>MSE = 21,49 | MAE = 3,50</a:t>
+            </a:r>
+            <a:r>
+              <a:rPr lang="en-US" dirty="0">
+                <a:solidFill>
+                  <a:srgbClr val="290606"/>
+                </a:solidFill>
+                <a:latin typeface="Telegraf"/>
+                <a:ea typeface="Telegraf"/>
+                <a:cs typeface="Telegraf"/>
+                <a:sym typeface="Telegraf"/>
+              </a:rPr>
+              <a:t>)</a:t>
+            </a:r>
+          </a:p>
+        </p:txBody>
+      </p:sp>
+      <p:sp>
+        <p:nvSpPr>
+          <p:cNvPr id="10" name="TextBox 24">
+            <a:extLst>
+              <a:ext uri="{FF2B5EF4-FFF2-40B4-BE49-F238E27FC236}">
+                <a16:creationId xmlns:a16="http://schemas.microsoft.com/office/drawing/2014/main" id="{64A355DC-B5A2-C508-C559-13A089AD3E71}"/>
+              </a:ext>
+            </a:extLst>
+          </p:cNvPr>
+          <p:cNvSpPr txBox="1"/>
+          <p:nvPr/>
+        </p:nvSpPr>
+        <p:spPr>
+          <a:xfrm>
+            <a:off x="11316466" y="6051528"/>
+            <a:ext cx="5031097" cy="407163"/>
+          </a:xfrm>
+          <a:prstGeom prst="rect">
+            <a:avLst/>
+          </a:prstGeom>
+        </p:spPr>
+        <p:txBody>
+          <a:bodyPr wrap="square" lIns="0" tIns="0" rIns="0" bIns="0" rtlCol="0" anchor="t">
+            <a:spAutoFit/>
+          </a:bodyPr>
+          <a:lstStyle/>
+          <a:p>
+            <a:pPr marL="280672" lvl="1" algn="ctr">
+              <a:lnSpc>
+                <a:spcPts val="3640"/>
+              </a:lnSpc>
+            </a:pPr>
+            <a:r>
+              <a:rPr lang="it-IT" dirty="0">
+                <a:solidFill>
+                  <a:srgbClr val="290606"/>
+                </a:solidFill>
+                <a:latin typeface="Telegraf"/>
+                <a:ea typeface="Telegraf"/>
+                <a:cs typeface="Telegraf"/>
+                <a:sym typeface="Telegraf"/>
+              </a:rPr>
+              <a:t>IDEA 10 (</a:t>
+            </a:r>
+            <a:r>
+              <a:rPr lang="en-US" sz="1800" dirty="0">
+                <a:latin typeface="Telegraf" panose="020B0604020202020204" charset="0"/>
+                <a:ea typeface="Telegraf Bold"/>
+                <a:cs typeface="Telegraf Bold"/>
+                <a:sym typeface="Telegraf Bold"/>
+              </a:rPr>
+              <a:t>MSE = 25,89 | MAE = 3,75</a:t>
+            </a:r>
+            <a:r>
+              <a:rPr lang="en-US" dirty="0">
+                <a:solidFill>
+                  <a:srgbClr val="290606"/>
+                </a:solidFill>
+                <a:latin typeface="Telegraf"/>
+                <a:ea typeface="Telegraf"/>
+                <a:cs typeface="Telegraf"/>
+                <a:sym typeface="Telegraf"/>
+              </a:rPr>
+              <a:t>)</a:t>
+            </a:r>
+          </a:p>
+        </p:txBody>
+      </p:sp>
+      <p:pic>
+        <p:nvPicPr>
+          <p:cNvPr id="14" name="Immagine 13" descr="Immagine che contiene testo, Diagramma, diagramma, schermata&#10;&#10;Descrizione generata automaticamente">
+            <a:extLst>
+              <a:ext uri="{FF2B5EF4-FFF2-40B4-BE49-F238E27FC236}">
+                <a16:creationId xmlns:a16="http://schemas.microsoft.com/office/drawing/2014/main" id="{31A0C273-E666-1D49-8464-399722A84129}"/>
+              </a:ext>
+            </a:extLst>
+          </p:cNvPr>
+          <p:cNvPicPr>
+            <a:picLocks noChangeAspect="1"/>
+          </p:cNvPicPr>
+          <p:nvPr/>
+        </p:nvPicPr>
+        <p:blipFill>
+          <a:blip r:embed="rId5">
+            <a:extLst>
+              <a:ext uri="{28A0092B-C50C-407E-A947-70E740481C1C}">
+                <a14:useLocalDpi xmlns:a14="http://schemas.microsoft.com/office/drawing/2010/main" val="0"/>
+              </a:ext>
+            </a:extLst>
+          </a:blip>
+          <a:stretch>
+            <a:fillRect/>
+          </a:stretch>
+        </p:blipFill>
+        <p:spPr>
+          <a:xfrm>
+            <a:off x="11431897" y="6458692"/>
+            <a:ext cx="4800236" cy="3476033"/>
+          </a:xfrm>
+          <a:prstGeom prst="rect">
+            <a:avLst/>
+          </a:prstGeom>
+        </p:spPr>
+      </p:pic>
+    </p:spTree>
+    <p:extLst>
+      <p:ext uri="{BB962C8B-B14F-4D97-AF65-F5344CB8AC3E}">
+        <p14:creationId xmlns:p14="http://schemas.microsoft.com/office/powerpoint/2010/main" val="3524133313"/>
+      </p:ext>
+    </p:extLst>
+  </p:cSld>
+  <p:clrMapOvr>
+    <a:masterClrMapping/>
+  </p:clrMapOvr>
+</p:sld>
+</file>
+
+<file path=ppt/slides/slide16.xml><?xml version="1.0" encoding="utf-8"?>
+<p:sld xmlns:a="http://schemas.openxmlformats.org/drawingml/2006/main" xmlns:r="http://schemas.openxmlformats.org/officeDocument/2006/relationships" xmlns:p="http://schemas.openxmlformats.org/presentationml/2006/main">
+  <p:cSld>
+    <p:bg>
+      <p:bgPr>
+        <a:solidFill>
+          <a:srgbClr val="EEF4F3"/>
+        </a:solidFill>
+        <a:effectLst/>
+      </p:bgPr>
+    </p:bg>
+    <p:spTree>
+      <p:nvGrpSpPr>
         <p:cNvPr id="1" name=""/>
         <p:cNvGrpSpPr/>
         <p:nvPr/>
@@ -9497,7 +11415,7 @@
         <p:spPr>
           <a:xfrm>
             <a:off x="7014430" y="3156783"/>
-            <a:ext cx="8897921" cy="6001643"/>
+            <a:ext cx="8897921" cy="6463308"/>
           </a:xfrm>
           <a:prstGeom prst="rect">
             <a:avLst/>
@@ -9524,7 +11442,79 @@
                 <a:cs typeface="Telegraf"/>
                 <a:sym typeface="Telegraf"/>
               </a:rPr>
-              <a:t>Il modello sviluppato si è dimostrato abbastanza affidabile, infatti anche dopo altre prove eseguite con immagini trovate su internet esso ha performato in maniera discreta.</a:t>
+              <a:t>Il modello </a:t>
+            </a:r>
+            <a:r>
+              <a:rPr lang="it-IT" sz="2600" i="1" spc="147" dirty="0">
+                <a:solidFill>
+                  <a:srgbClr val="290606"/>
+                </a:solidFill>
+                <a:latin typeface="Telegraf"/>
+                <a:ea typeface="Telegraf"/>
+                <a:cs typeface="Telegraf"/>
+                <a:sym typeface="Telegraf"/>
+              </a:rPr>
+              <a:t>idea 10 </a:t>
+            </a:r>
+            <a:r>
+              <a:rPr lang="it-IT" sz="2600" spc="147" dirty="0">
+                <a:solidFill>
+                  <a:srgbClr val="290606"/>
+                </a:solidFill>
+                <a:latin typeface="Telegraf"/>
+                <a:ea typeface="Telegraf"/>
+                <a:cs typeface="Telegraf"/>
+                <a:sym typeface="Telegraf"/>
+              </a:rPr>
+              <a:t>sviluppato si è dimostrato più preciso rispetto alla </a:t>
+            </a:r>
+            <a:r>
+              <a:rPr lang="it-IT" sz="2600" i="1" spc="147" dirty="0">
+                <a:solidFill>
+                  <a:srgbClr val="290606"/>
+                </a:solidFill>
+                <a:latin typeface="Telegraf"/>
+                <a:ea typeface="Telegraf"/>
+                <a:cs typeface="Telegraf"/>
+                <a:sym typeface="Telegraf"/>
+              </a:rPr>
+              <a:t>idea 6,</a:t>
+            </a:r>
+            <a:r>
+              <a:rPr lang="it-IT" sz="2600" spc="147" dirty="0">
+                <a:solidFill>
+                  <a:srgbClr val="290606"/>
+                </a:solidFill>
+                <a:latin typeface="Telegraf"/>
+                <a:ea typeface="Telegraf"/>
+                <a:cs typeface="Telegraf"/>
+                <a:sym typeface="Telegraf"/>
+              </a:rPr>
+              <a:t> infatti dopo una fase finale di valutazione effettuata con immagini prese da internet, il BMI predetto si avvicinava di più ai valori reali e più bilanciati rispetto alla </a:t>
+            </a:r>
+            <a:r>
+              <a:rPr lang="it-IT" sz="2600" i="1" spc="147" dirty="0">
+                <a:solidFill>
+                  <a:srgbClr val="290606"/>
+                </a:solidFill>
+                <a:latin typeface="Telegraf"/>
+                <a:ea typeface="Telegraf"/>
+                <a:cs typeface="Telegraf"/>
+                <a:sym typeface="Telegraf"/>
+              </a:rPr>
+              <a:t>idea 6</a:t>
+            </a:r>
+            <a:r>
+              <a:rPr lang="it-IT" sz="2600" spc="147" dirty="0">
+                <a:solidFill>
+                  <a:srgbClr val="290606"/>
+                </a:solidFill>
+                <a:latin typeface="Telegraf"/>
+                <a:ea typeface="Telegraf"/>
+                <a:cs typeface="Telegraf"/>
+                <a:sym typeface="Telegraf"/>
+              </a:rPr>
+              <a:t>.</a:t>
             </a:r>
           </a:p>
           <a:p>
@@ -11229,8 +13219,8 @@
         </p:nvSpPr>
         <p:spPr>
           <a:xfrm>
-            <a:off x="1123950" y="6540177"/>
-            <a:ext cx="16040100" cy="3770263"/>
+            <a:off x="0" y="6591300"/>
+            <a:ext cx="18288000" cy="3198568"/>
           </a:xfrm>
           <a:prstGeom prst="rect">
             <a:avLst/>
@@ -11248,7 +13238,7 @@
               </a:lnSpc>
             </a:pPr>
             <a:r>
-              <a:rPr lang="it-IT" sz="3500" spc="171" dirty="0">
+              <a:rPr lang="it-IT" sz="3000" spc="171" dirty="0">
                 <a:solidFill>
                   <a:srgbClr val="290606"/>
                 </a:solidFill>
@@ -11257,10 +13247,10 @@
                 <a:cs typeface="Telegraf"/>
                 <a:sym typeface="Telegraf"/>
               </a:rPr>
-              <a:t>Si è deciso di iniziare identificando il volto della persona presente nell'immagine, utilizzando tecniche di rilevamento facciale (classificatore pre-addestrato, messo a disposizione da </a:t>
-            </a:r>
-            <a:r>
-              <a:rPr lang="it-IT" sz="3500" i="1" spc="171" dirty="0">
+              <a:t>Si è deciso di iniziare identificando il volto della persona presente nell'immagine, utilizzando tecniche di rilevamento facciale (classificatore pre-addestrato, </a:t>
+            </a:r>
+            <a:r>
+              <a:rPr lang="it-IT" sz="3000" i="1" spc="171" dirty="0" err="1">
                 <a:solidFill>
                   <a:srgbClr val="290606"/>
                 </a:solidFill>
@@ -11272,7 +13262,7 @@
               <a:t>OpenCV</a:t>
             </a:r>
             <a:r>
-              <a:rPr lang="it-IT" sz="3500" spc="171" dirty="0">
+              <a:rPr lang="it-IT" sz="3000" spc="171" dirty="0">
                 <a:solidFill>
                   <a:srgbClr val="290606"/>
                 </a:solidFill>
@@ -11291,7 +13281,7 @@
               </a:lnSpc>
             </a:pPr>
             <a:r>
-              <a:rPr lang="it-IT" sz="3500" spc="171" dirty="0">
+              <a:rPr lang="it-IT" sz="3000" spc="171" dirty="0">
                 <a:solidFill>
                   <a:srgbClr val="290606"/>
                 </a:solidFill>
@@ -11303,7 +13293,7 @@
               <a:t>Una volta individuato il volto, si è proceduto effettuando un’operazione di ritaglio del volto (modello </a:t>
             </a:r>
             <a:r>
-              <a:rPr lang="it-IT" sz="3500" i="1" spc="171" dirty="0">
+              <a:rPr lang="it-IT" sz="3000" i="1" spc="171" dirty="0">
                 <a:solidFill>
                   <a:srgbClr val="290606"/>
                 </a:solidFill>
@@ -11315,7 +13305,7 @@
               <a:t>dlib</a:t>
             </a:r>
             <a:r>
-              <a:rPr lang="it-IT" sz="3500" spc="171" dirty="0">
+              <a:rPr lang="it-IT" sz="3000" spc="171" dirty="0">
                 <a:solidFill>
                   <a:srgbClr val="290606"/>
                 </a:solidFill>
@@ -11324,7 +13314,66 @@
                 <a:cs typeface="Telegraf"/>
                 <a:sym typeface="Telegraf"/>
               </a:rPr>
-              <a:t>) e infine una operazione di parsing, che ha consentito di isolare l'area del volto, evidenziandola.</a:t>
+              <a:t>), salvando dunque l’immagine del volto della persona</a:t>
+            </a:r>
+            <a:r>
+              <a:rPr lang="it-IT" sz="3000" i="1" spc="171" dirty="0">
+                <a:solidFill>
+                  <a:srgbClr val="290606"/>
+                </a:solidFill>
+                <a:latin typeface="Telegraf"/>
+                <a:ea typeface="Telegraf"/>
+                <a:cs typeface="Telegraf"/>
+                <a:sym typeface="Telegraf"/>
+              </a:rPr>
+              <a:t>.</a:t>
+            </a:r>
+            <a:br>
+              <a:rPr lang="it-IT" sz="3000" i="1" spc="171" dirty="0">
+                <a:solidFill>
+                  <a:srgbClr val="290606"/>
+                </a:solidFill>
+                <a:latin typeface="Telegraf"/>
+                <a:ea typeface="Telegraf"/>
+                <a:cs typeface="Telegraf"/>
+                <a:sym typeface="Telegraf"/>
+              </a:rPr>
+            </a:br>
+            <a:r>
+              <a:rPr lang="it-IT" sz="3000" spc="171" dirty="0">
+                <a:solidFill>
+                  <a:srgbClr val="290606"/>
+                </a:solidFill>
+                <a:latin typeface="Telegraf"/>
+                <a:ea typeface="Telegraf"/>
+                <a:cs typeface="Telegraf"/>
+                <a:sym typeface="Telegraf"/>
+              </a:rPr>
+              <a:t>(Nel caso dell’idea 6 l’immagine ha subito una ulteriore fase, ovvero quella di </a:t>
+            </a:r>
+            <a:r>
+              <a:rPr lang="it-IT" sz="3000" spc="171" dirty="0" err="1">
+                <a:solidFill>
+                  <a:srgbClr val="290606"/>
+                </a:solidFill>
+                <a:latin typeface="Telegraf"/>
+                <a:ea typeface="Telegraf"/>
+                <a:cs typeface="Telegraf"/>
+                <a:sym typeface="Telegraf"/>
+              </a:rPr>
+              <a:t>parsing</a:t>
+            </a:r>
+            <a:r>
+              <a:rPr lang="it-IT" sz="3000" spc="171" dirty="0">
+                <a:solidFill>
+                  <a:srgbClr val="290606"/>
+                </a:solidFill>
+                <a:latin typeface="Telegraf"/>
+                <a:ea typeface="Telegraf"/>
+                <a:cs typeface="Telegraf"/>
+                <a:sym typeface="Telegraf"/>
+              </a:rPr>
+              <a:t>, che ha permesso di isolare il volto della persona con una maschera bianca).</a:t>
             </a:r>
           </a:p>
         </p:txBody>
@@ -11356,8 +13405,8 @@
         </p:blipFill>
         <p:spPr>
           <a:xfrm>
-            <a:off x="3543300" y="2400300"/>
-            <a:ext cx="11201400" cy="3524707"/>
+            <a:off x="5910529" y="2400300"/>
+            <a:ext cx="6466941" cy="3524707"/>
           </a:xfrm>
           <a:prstGeom prst="rect">
             <a:avLst/>

</xml_diff>